<commit_message>
Developed proposal for quantification method
</commit_message>
<xml_diff>
--- a/proposalOutline.pptx
+++ b/proposalOutline.pptx
@@ -2,11 +2,18 @@
 <file path=ppt/presentation.xml><?xml version="1.0" encoding="utf-8"?>
 <p:presentation xmlns:a="http://schemas.openxmlformats.org/drawingml/2006/main" xmlns:r="http://schemas.openxmlformats.org/officeDocument/2006/relationships" xmlns:p="http://schemas.openxmlformats.org/presentationml/2006/main" saveSubsetFonts="1">
   <p:sldMasterIdLst>
-    <p:sldMasterId id="2147483648" r:id="rId1"/>
+    <p:sldMasterId id="2147483672" r:id="rId1"/>
   </p:sldMasterIdLst>
   <p:sldIdLst>
     <p:sldId id="256" r:id="rId2"/>
     <p:sldId id="257" r:id="rId3"/>
+    <p:sldId id="259" r:id="rId4"/>
+    <p:sldId id="260" r:id="rId5"/>
+    <p:sldId id="261" r:id="rId6"/>
+    <p:sldId id="263" r:id="rId7"/>
+    <p:sldId id="265" r:id="rId8"/>
+    <p:sldId id="266" r:id="rId9"/>
+    <p:sldId id="267" r:id="rId10"/>
   </p:sldIdLst>
   <p:sldSz cx="12192000" cy="6858000"/>
   <p:notesSz cx="6858000" cy="9144000"/>
@@ -146,7 +153,7 @@
           <p:cNvPr id="2" name="Title 1">
             <a:extLst>
               <a:ext uri="{FF2B5EF4-FFF2-40B4-BE49-F238E27FC236}">
-                <a16:creationId xmlns:a16="http://schemas.microsoft.com/office/drawing/2014/main" id="{BC410E12-94C1-4E69-A16D-0F613A0093BB}"/>
+                <a16:creationId xmlns:a16="http://schemas.microsoft.com/office/drawing/2014/main" id="{5F3D60CE-F15F-4F3A-8E2B-F7385D5FD253}"/>
               </a:ext>
             </a:extLst>
           </p:cNvPr>
@@ -183,7 +190,7 @@
           <p:cNvPr id="3" name="Subtitle 2">
             <a:extLst>
               <a:ext uri="{FF2B5EF4-FFF2-40B4-BE49-F238E27FC236}">
-                <a16:creationId xmlns:a16="http://schemas.microsoft.com/office/drawing/2014/main" id="{6205C408-4E62-49FD-989F-78E977401C7A}"/>
+                <a16:creationId xmlns:a16="http://schemas.microsoft.com/office/drawing/2014/main" id="{A282458D-881F-41AA-9081-C6B1FFEEF1E6}"/>
               </a:ext>
             </a:extLst>
           </p:cNvPr>
@@ -253,7 +260,7 @@
           <p:cNvPr id="4" name="Date Placeholder 3">
             <a:extLst>
               <a:ext uri="{FF2B5EF4-FFF2-40B4-BE49-F238E27FC236}">
-                <a16:creationId xmlns:a16="http://schemas.microsoft.com/office/drawing/2014/main" id="{045412B8-92CC-4D43-941D-12D4DD147E6D}"/>
+                <a16:creationId xmlns:a16="http://schemas.microsoft.com/office/drawing/2014/main" id="{41C4EECC-A7B0-4AF6-B85B-5FDF9160D5A1}"/>
               </a:ext>
             </a:extLst>
           </p:cNvPr>
@@ -271,7 +278,7 @@
           <a:p>
             <a:fld id="{E12641E5-F56E-4059-B0E7-6FA6A75637F3}" type="datetimeFigureOut">
               <a:rPr lang="en-US" smtClean="0"/>
-              <a:t>11/5/2019</a:t>
+              <a:t>11/13/2019</a:t>
             </a:fld>
             <a:endParaRPr lang="en-US"/>
           </a:p>
@@ -282,7 +289,7 @@
           <p:cNvPr id="5" name="Footer Placeholder 4">
             <a:extLst>
               <a:ext uri="{FF2B5EF4-FFF2-40B4-BE49-F238E27FC236}">
-                <a16:creationId xmlns:a16="http://schemas.microsoft.com/office/drawing/2014/main" id="{29FEB51C-94D1-474A-8B9E-A4104641E5D1}"/>
+                <a16:creationId xmlns:a16="http://schemas.microsoft.com/office/drawing/2014/main" id="{108155E5-5904-40BB-88B5-D3FFB7A0D9BB}"/>
               </a:ext>
             </a:extLst>
           </p:cNvPr>
@@ -307,7 +314,7 @@
           <p:cNvPr id="6" name="Slide Number Placeholder 5">
             <a:extLst>
               <a:ext uri="{FF2B5EF4-FFF2-40B4-BE49-F238E27FC236}">
-                <a16:creationId xmlns:a16="http://schemas.microsoft.com/office/drawing/2014/main" id="{CBBAD8A6-7969-4392-9DF4-A35EBF32043B}"/>
+                <a16:creationId xmlns:a16="http://schemas.microsoft.com/office/drawing/2014/main" id="{FE7379E3-E5F2-4AA8-8BF4-3617DEB45742}"/>
               </a:ext>
             </a:extLst>
           </p:cNvPr>
@@ -334,7 +341,7 @@
     </p:spTree>
     <p:extLst>
       <p:ext uri="{BB962C8B-B14F-4D97-AF65-F5344CB8AC3E}">
-        <p14:creationId xmlns:p14="http://schemas.microsoft.com/office/powerpoint/2010/main" val="410591858"/>
+        <p14:creationId xmlns:p14="http://schemas.microsoft.com/office/powerpoint/2010/main" val="1203616743"/>
       </p:ext>
     </p:extLst>
   </p:cSld>
@@ -366,7 +373,7 @@
           <p:cNvPr id="2" name="Title 1">
             <a:extLst>
               <a:ext uri="{FF2B5EF4-FFF2-40B4-BE49-F238E27FC236}">
-                <a16:creationId xmlns:a16="http://schemas.microsoft.com/office/drawing/2014/main" id="{A9E8BD3E-6920-4702-B5A7-C972D5147D16}"/>
+                <a16:creationId xmlns:a16="http://schemas.microsoft.com/office/drawing/2014/main" id="{E80C602B-AEF8-46B2-8EFF-1902591E0B25}"/>
               </a:ext>
             </a:extLst>
           </p:cNvPr>
@@ -394,7 +401,7 @@
           <p:cNvPr id="3" name="Vertical Text Placeholder 2">
             <a:extLst>
               <a:ext uri="{FF2B5EF4-FFF2-40B4-BE49-F238E27FC236}">
-                <a16:creationId xmlns:a16="http://schemas.microsoft.com/office/drawing/2014/main" id="{BC265D68-A0AA-40DA-8D4D-A29201699FFE}"/>
+                <a16:creationId xmlns:a16="http://schemas.microsoft.com/office/drawing/2014/main" id="{918AA8CE-29D1-487C-B879-7A12E64BB9C1}"/>
               </a:ext>
             </a:extLst>
           </p:cNvPr>
@@ -451,7 +458,7 @@
           <p:cNvPr id="4" name="Date Placeholder 3">
             <a:extLst>
               <a:ext uri="{FF2B5EF4-FFF2-40B4-BE49-F238E27FC236}">
-                <a16:creationId xmlns:a16="http://schemas.microsoft.com/office/drawing/2014/main" id="{EF1DAE8D-F75B-4E94-87D6-CC4AF31DC38B}"/>
+                <a16:creationId xmlns:a16="http://schemas.microsoft.com/office/drawing/2014/main" id="{EBF23140-335C-47E3-9CA1-2EBD8B15126E}"/>
               </a:ext>
             </a:extLst>
           </p:cNvPr>
@@ -469,7 +476,7 @@
           <a:p>
             <a:fld id="{E12641E5-F56E-4059-B0E7-6FA6A75637F3}" type="datetimeFigureOut">
               <a:rPr lang="en-US" smtClean="0"/>
-              <a:t>11/5/2019</a:t>
+              <a:t>11/13/2019</a:t>
             </a:fld>
             <a:endParaRPr lang="en-US"/>
           </a:p>
@@ -480,7 +487,7 @@
           <p:cNvPr id="5" name="Footer Placeholder 4">
             <a:extLst>
               <a:ext uri="{FF2B5EF4-FFF2-40B4-BE49-F238E27FC236}">
-                <a16:creationId xmlns:a16="http://schemas.microsoft.com/office/drawing/2014/main" id="{6AF531D2-842D-4C87-8E59-EF0C5B0D9A74}"/>
+                <a16:creationId xmlns:a16="http://schemas.microsoft.com/office/drawing/2014/main" id="{A4794A8F-F487-42B3-9756-BF486C6008DF}"/>
               </a:ext>
             </a:extLst>
           </p:cNvPr>
@@ -505,7 +512,7 @@
           <p:cNvPr id="6" name="Slide Number Placeholder 5">
             <a:extLst>
               <a:ext uri="{FF2B5EF4-FFF2-40B4-BE49-F238E27FC236}">
-                <a16:creationId xmlns:a16="http://schemas.microsoft.com/office/drawing/2014/main" id="{7C70BC93-3B37-4B4C-B20C-D951FD76C0A7}"/>
+                <a16:creationId xmlns:a16="http://schemas.microsoft.com/office/drawing/2014/main" id="{CF9FB6B4-B3EF-498B-81F0-AC5AE7EB76BE}"/>
               </a:ext>
             </a:extLst>
           </p:cNvPr>
@@ -532,7 +539,7 @@
     </p:spTree>
     <p:extLst>
       <p:ext uri="{BB962C8B-B14F-4D97-AF65-F5344CB8AC3E}">
-        <p14:creationId xmlns:p14="http://schemas.microsoft.com/office/powerpoint/2010/main" val="2914149647"/>
+        <p14:creationId xmlns:p14="http://schemas.microsoft.com/office/powerpoint/2010/main" val="1027321567"/>
       </p:ext>
     </p:extLst>
   </p:cSld>
@@ -564,7 +571,7 @@
           <p:cNvPr id="2" name="Vertical Title 1">
             <a:extLst>
               <a:ext uri="{FF2B5EF4-FFF2-40B4-BE49-F238E27FC236}">
-                <a16:creationId xmlns:a16="http://schemas.microsoft.com/office/drawing/2014/main" id="{3BABA15D-8655-4BAD-9050-10BDD5C7D7D8}"/>
+                <a16:creationId xmlns:a16="http://schemas.microsoft.com/office/drawing/2014/main" id="{D093764F-6D05-45EB-BFDD-34095FCE5139}"/>
               </a:ext>
             </a:extLst>
           </p:cNvPr>
@@ -597,7 +604,7 @@
           <p:cNvPr id="3" name="Vertical Text Placeholder 2">
             <a:extLst>
               <a:ext uri="{FF2B5EF4-FFF2-40B4-BE49-F238E27FC236}">
-                <a16:creationId xmlns:a16="http://schemas.microsoft.com/office/drawing/2014/main" id="{245B9ED7-E07E-4F1D-BA86-70E39EA35FD2}"/>
+                <a16:creationId xmlns:a16="http://schemas.microsoft.com/office/drawing/2014/main" id="{E653F268-0311-473F-9BDA-6A807E6B199A}"/>
               </a:ext>
             </a:extLst>
           </p:cNvPr>
@@ -659,7 +666,7 @@
           <p:cNvPr id="4" name="Date Placeholder 3">
             <a:extLst>
               <a:ext uri="{FF2B5EF4-FFF2-40B4-BE49-F238E27FC236}">
-                <a16:creationId xmlns:a16="http://schemas.microsoft.com/office/drawing/2014/main" id="{0B21A0FE-6F35-437A-9528-91BF244ACFEB}"/>
+                <a16:creationId xmlns:a16="http://schemas.microsoft.com/office/drawing/2014/main" id="{71830D7A-1C07-47DE-BA72-9A0E464AE231}"/>
               </a:ext>
             </a:extLst>
           </p:cNvPr>
@@ -677,7 +684,7 @@
           <a:p>
             <a:fld id="{E12641E5-F56E-4059-B0E7-6FA6A75637F3}" type="datetimeFigureOut">
               <a:rPr lang="en-US" smtClean="0"/>
-              <a:t>11/5/2019</a:t>
+              <a:t>11/13/2019</a:t>
             </a:fld>
             <a:endParaRPr lang="en-US"/>
           </a:p>
@@ -688,7 +695,7 @@
           <p:cNvPr id="5" name="Footer Placeholder 4">
             <a:extLst>
               <a:ext uri="{FF2B5EF4-FFF2-40B4-BE49-F238E27FC236}">
-                <a16:creationId xmlns:a16="http://schemas.microsoft.com/office/drawing/2014/main" id="{D3BD86A5-ABA4-4EE8-BF70-3B10FD6B4DA6}"/>
+                <a16:creationId xmlns:a16="http://schemas.microsoft.com/office/drawing/2014/main" id="{89D39C70-B83D-4013-8A7D-5895580BD985}"/>
               </a:ext>
             </a:extLst>
           </p:cNvPr>
@@ -713,7 +720,7 @@
           <p:cNvPr id="6" name="Slide Number Placeholder 5">
             <a:extLst>
               <a:ext uri="{FF2B5EF4-FFF2-40B4-BE49-F238E27FC236}">
-                <a16:creationId xmlns:a16="http://schemas.microsoft.com/office/drawing/2014/main" id="{E00BA9CB-FFA3-4207-8740-E281DD82D1E0}"/>
+                <a16:creationId xmlns:a16="http://schemas.microsoft.com/office/drawing/2014/main" id="{A5E2F559-7652-45AC-BCFA-703A874EBEA2}"/>
               </a:ext>
             </a:extLst>
           </p:cNvPr>
@@ -740,7 +747,7 @@
     </p:spTree>
     <p:extLst>
       <p:ext uri="{BB962C8B-B14F-4D97-AF65-F5344CB8AC3E}">
-        <p14:creationId xmlns:p14="http://schemas.microsoft.com/office/powerpoint/2010/main" val="3582478757"/>
+        <p14:creationId xmlns:p14="http://schemas.microsoft.com/office/powerpoint/2010/main" val="568646531"/>
       </p:ext>
     </p:extLst>
   </p:cSld>
@@ -772,7 +779,7 @@
           <p:cNvPr id="2" name="Title 1">
             <a:extLst>
               <a:ext uri="{FF2B5EF4-FFF2-40B4-BE49-F238E27FC236}">
-                <a16:creationId xmlns:a16="http://schemas.microsoft.com/office/drawing/2014/main" id="{EBAFC629-1BCB-4A8B-92E6-AF82030A6599}"/>
+                <a16:creationId xmlns:a16="http://schemas.microsoft.com/office/drawing/2014/main" id="{6DDF17C3-9E73-49D8-B1B1-29202BE2825F}"/>
               </a:ext>
             </a:extLst>
           </p:cNvPr>
@@ -800,7 +807,7 @@
           <p:cNvPr id="3" name="Content Placeholder 2">
             <a:extLst>
               <a:ext uri="{FF2B5EF4-FFF2-40B4-BE49-F238E27FC236}">
-                <a16:creationId xmlns:a16="http://schemas.microsoft.com/office/drawing/2014/main" id="{D95F357A-1985-4457-B791-24D552421514}"/>
+                <a16:creationId xmlns:a16="http://schemas.microsoft.com/office/drawing/2014/main" id="{3213E3D5-C3B9-48DC-BC80-DA3202B2CD7C}"/>
               </a:ext>
             </a:extLst>
           </p:cNvPr>
@@ -857,7 +864,7 @@
           <p:cNvPr id="4" name="Date Placeholder 3">
             <a:extLst>
               <a:ext uri="{FF2B5EF4-FFF2-40B4-BE49-F238E27FC236}">
-                <a16:creationId xmlns:a16="http://schemas.microsoft.com/office/drawing/2014/main" id="{050BAE14-F580-45A3-B4C2-372022958DD0}"/>
+                <a16:creationId xmlns:a16="http://schemas.microsoft.com/office/drawing/2014/main" id="{F0304900-7F90-403C-8892-8DB20EA04F93}"/>
               </a:ext>
             </a:extLst>
           </p:cNvPr>
@@ -875,7 +882,7 @@
           <a:p>
             <a:fld id="{E12641E5-F56E-4059-B0E7-6FA6A75637F3}" type="datetimeFigureOut">
               <a:rPr lang="en-US" smtClean="0"/>
-              <a:t>11/5/2019</a:t>
+              <a:t>11/13/2019</a:t>
             </a:fld>
             <a:endParaRPr lang="en-US"/>
           </a:p>
@@ -886,7 +893,7 @@
           <p:cNvPr id="5" name="Footer Placeholder 4">
             <a:extLst>
               <a:ext uri="{FF2B5EF4-FFF2-40B4-BE49-F238E27FC236}">
-                <a16:creationId xmlns:a16="http://schemas.microsoft.com/office/drawing/2014/main" id="{0763395C-786B-4694-A2B4-E3EF8C753603}"/>
+                <a16:creationId xmlns:a16="http://schemas.microsoft.com/office/drawing/2014/main" id="{FBF5DBFD-5E58-4315-8E8F-7C75AF280530}"/>
               </a:ext>
             </a:extLst>
           </p:cNvPr>
@@ -911,7 +918,7 @@
           <p:cNvPr id="6" name="Slide Number Placeholder 5">
             <a:extLst>
               <a:ext uri="{FF2B5EF4-FFF2-40B4-BE49-F238E27FC236}">
-                <a16:creationId xmlns:a16="http://schemas.microsoft.com/office/drawing/2014/main" id="{E5780990-83F5-4059-9D23-6F8C6AF48ED4}"/>
+                <a16:creationId xmlns:a16="http://schemas.microsoft.com/office/drawing/2014/main" id="{521FF3D1-5E61-4780-AB97-00C651BB7D16}"/>
               </a:ext>
             </a:extLst>
           </p:cNvPr>
@@ -938,7 +945,7 @@
     </p:spTree>
     <p:extLst>
       <p:ext uri="{BB962C8B-B14F-4D97-AF65-F5344CB8AC3E}">
-        <p14:creationId xmlns:p14="http://schemas.microsoft.com/office/powerpoint/2010/main" val="2285240868"/>
+        <p14:creationId xmlns:p14="http://schemas.microsoft.com/office/powerpoint/2010/main" val="1496159636"/>
       </p:ext>
     </p:extLst>
   </p:cSld>
@@ -970,7 +977,7 @@
           <p:cNvPr id="2" name="Title 1">
             <a:extLst>
               <a:ext uri="{FF2B5EF4-FFF2-40B4-BE49-F238E27FC236}">
-                <a16:creationId xmlns:a16="http://schemas.microsoft.com/office/drawing/2014/main" id="{A1AB31AF-84B4-4C5D-BA3D-2874BE9138C4}"/>
+                <a16:creationId xmlns:a16="http://schemas.microsoft.com/office/drawing/2014/main" id="{89DD274D-7C91-4E52-AC77-1F8703EA2D5F}"/>
               </a:ext>
             </a:extLst>
           </p:cNvPr>
@@ -1007,7 +1014,7 @@
           <p:cNvPr id="3" name="Text Placeholder 2">
             <a:extLst>
               <a:ext uri="{FF2B5EF4-FFF2-40B4-BE49-F238E27FC236}">
-                <a16:creationId xmlns:a16="http://schemas.microsoft.com/office/drawing/2014/main" id="{9DE9A553-094F-4E39-BC67-2AF828B00E65}"/>
+                <a16:creationId xmlns:a16="http://schemas.microsoft.com/office/drawing/2014/main" id="{7F4EC65E-30BD-4320-BEC5-8B12AC12BDDF}"/>
               </a:ext>
             </a:extLst>
           </p:cNvPr>
@@ -1132,7 +1139,7 @@
           <p:cNvPr id="4" name="Date Placeholder 3">
             <a:extLst>
               <a:ext uri="{FF2B5EF4-FFF2-40B4-BE49-F238E27FC236}">
-                <a16:creationId xmlns:a16="http://schemas.microsoft.com/office/drawing/2014/main" id="{0E892F50-3927-44BB-A460-D31048E653F8}"/>
+                <a16:creationId xmlns:a16="http://schemas.microsoft.com/office/drawing/2014/main" id="{DB67F142-4BCF-4EE8-9B33-EED17CA905D3}"/>
               </a:ext>
             </a:extLst>
           </p:cNvPr>
@@ -1150,7 +1157,7 @@
           <a:p>
             <a:fld id="{E12641E5-F56E-4059-B0E7-6FA6A75637F3}" type="datetimeFigureOut">
               <a:rPr lang="en-US" smtClean="0"/>
-              <a:t>11/5/2019</a:t>
+              <a:t>11/13/2019</a:t>
             </a:fld>
             <a:endParaRPr lang="en-US"/>
           </a:p>
@@ -1161,7 +1168,7 @@
           <p:cNvPr id="5" name="Footer Placeholder 4">
             <a:extLst>
               <a:ext uri="{FF2B5EF4-FFF2-40B4-BE49-F238E27FC236}">
-                <a16:creationId xmlns:a16="http://schemas.microsoft.com/office/drawing/2014/main" id="{70883725-1115-414A-BECE-EB97ADE1835B}"/>
+                <a16:creationId xmlns:a16="http://schemas.microsoft.com/office/drawing/2014/main" id="{9D12B5EA-7DDA-4BFA-9E31-8B166CC439FB}"/>
               </a:ext>
             </a:extLst>
           </p:cNvPr>
@@ -1186,7 +1193,7 @@
           <p:cNvPr id="6" name="Slide Number Placeholder 5">
             <a:extLst>
               <a:ext uri="{FF2B5EF4-FFF2-40B4-BE49-F238E27FC236}">
-                <a16:creationId xmlns:a16="http://schemas.microsoft.com/office/drawing/2014/main" id="{65CB3E5E-2F99-4797-BB4B-42FF3C25FF56}"/>
+                <a16:creationId xmlns:a16="http://schemas.microsoft.com/office/drawing/2014/main" id="{76C3BD67-D7C5-46B3-BD32-C8BC5531063D}"/>
               </a:ext>
             </a:extLst>
           </p:cNvPr>
@@ -1213,7 +1220,7 @@
     </p:spTree>
     <p:extLst>
       <p:ext uri="{BB962C8B-B14F-4D97-AF65-F5344CB8AC3E}">
-        <p14:creationId xmlns:p14="http://schemas.microsoft.com/office/powerpoint/2010/main" val="1625590351"/>
+        <p14:creationId xmlns:p14="http://schemas.microsoft.com/office/powerpoint/2010/main" val="3190450795"/>
       </p:ext>
     </p:extLst>
   </p:cSld>
@@ -1245,7 +1252,7 @@
           <p:cNvPr id="2" name="Title 1">
             <a:extLst>
               <a:ext uri="{FF2B5EF4-FFF2-40B4-BE49-F238E27FC236}">
-                <a16:creationId xmlns:a16="http://schemas.microsoft.com/office/drawing/2014/main" id="{EE0639CB-2494-4846-A464-AF85ED9B50D1}"/>
+                <a16:creationId xmlns:a16="http://schemas.microsoft.com/office/drawing/2014/main" id="{5CE4A263-826B-4779-AC08-2394BCD5DF66}"/>
               </a:ext>
             </a:extLst>
           </p:cNvPr>
@@ -1273,7 +1280,7 @@
           <p:cNvPr id="3" name="Content Placeholder 2">
             <a:extLst>
               <a:ext uri="{FF2B5EF4-FFF2-40B4-BE49-F238E27FC236}">
-                <a16:creationId xmlns:a16="http://schemas.microsoft.com/office/drawing/2014/main" id="{8ACA97CC-EA66-41E8-A55A-415505424CF0}"/>
+                <a16:creationId xmlns:a16="http://schemas.microsoft.com/office/drawing/2014/main" id="{4BE910F6-213D-49C9-A3D3-86470A6EC510}"/>
               </a:ext>
             </a:extLst>
           </p:cNvPr>
@@ -1335,7 +1342,7 @@
           <p:cNvPr id="4" name="Content Placeholder 3">
             <a:extLst>
               <a:ext uri="{FF2B5EF4-FFF2-40B4-BE49-F238E27FC236}">
-                <a16:creationId xmlns:a16="http://schemas.microsoft.com/office/drawing/2014/main" id="{D48BBB5E-EB79-41E4-AF5A-9246CD530DCE}"/>
+                <a16:creationId xmlns:a16="http://schemas.microsoft.com/office/drawing/2014/main" id="{A677E482-73DD-42AE-989D-BCE8500D46A6}"/>
               </a:ext>
             </a:extLst>
           </p:cNvPr>
@@ -1397,7 +1404,7 @@
           <p:cNvPr id="5" name="Date Placeholder 4">
             <a:extLst>
               <a:ext uri="{FF2B5EF4-FFF2-40B4-BE49-F238E27FC236}">
-                <a16:creationId xmlns:a16="http://schemas.microsoft.com/office/drawing/2014/main" id="{96A54E9F-0A1F-4281-82D6-54BED040C14B}"/>
+                <a16:creationId xmlns:a16="http://schemas.microsoft.com/office/drawing/2014/main" id="{263E1418-4786-490C-920A-9060B8A9E281}"/>
               </a:ext>
             </a:extLst>
           </p:cNvPr>
@@ -1415,7 +1422,7 @@
           <a:p>
             <a:fld id="{E12641E5-F56E-4059-B0E7-6FA6A75637F3}" type="datetimeFigureOut">
               <a:rPr lang="en-US" smtClean="0"/>
-              <a:t>11/5/2019</a:t>
+              <a:t>11/13/2019</a:t>
             </a:fld>
             <a:endParaRPr lang="en-US"/>
           </a:p>
@@ -1426,7 +1433,7 @@
           <p:cNvPr id="6" name="Footer Placeholder 5">
             <a:extLst>
               <a:ext uri="{FF2B5EF4-FFF2-40B4-BE49-F238E27FC236}">
-                <a16:creationId xmlns:a16="http://schemas.microsoft.com/office/drawing/2014/main" id="{F450D635-94AE-47A5-883A-A04947153914}"/>
+                <a16:creationId xmlns:a16="http://schemas.microsoft.com/office/drawing/2014/main" id="{3A5EB8BA-F4AD-4048-B673-D214FFD7B479}"/>
               </a:ext>
             </a:extLst>
           </p:cNvPr>
@@ -1451,7 +1458,7 @@
           <p:cNvPr id="7" name="Slide Number Placeholder 6">
             <a:extLst>
               <a:ext uri="{FF2B5EF4-FFF2-40B4-BE49-F238E27FC236}">
-                <a16:creationId xmlns:a16="http://schemas.microsoft.com/office/drawing/2014/main" id="{4C707060-4C44-4FF0-960C-19F0B1F23736}"/>
+                <a16:creationId xmlns:a16="http://schemas.microsoft.com/office/drawing/2014/main" id="{8535DE9E-DB4C-4F53-9DB6-5F76FD270BF4}"/>
               </a:ext>
             </a:extLst>
           </p:cNvPr>
@@ -1478,7 +1485,7 @@
     </p:spTree>
     <p:extLst>
       <p:ext uri="{BB962C8B-B14F-4D97-AF65-F5344CB8AC3E}">
-        <p14:creationId xmlns:p14="http://schemas.microsoft.com/office/powerpoint/2010/main" val="869037426"/>
+        <p14:creationId xmlns:p14="http://schemas.microsoft.com/office/powerpoint/2010/main" val="3338050083"/>
       </p:ext>
     </p:extLst>
   </p:cSld>
@@ -1510,7 +1517,7 @@
           <p:cNvPr id="2" name="Title 1">
             <a:extLst>
               <a:ext uri="{FF2B5EF4-FFF2-40B4-BE49-F238E27FC236}">
-                <a16:creationId xmlns:a16="http://schemas.microsoft.com/office/drawing/2014/main" id="{15D9D0E7-5DDC-43EE-9EF5-85CE97502CCF}"/>
+                <a16:creationId xmlns:a16="http://schemas.microsoft.com/office/drawing/2014/main" id="{86D09D4F-ECB5-443B-8B6C-3C780E4DCA7D}"/>
               </a:ext>
             </a:extLst>
           </p:cNvPr>
@@ -1543,7 +1550,7 @@
           <p:cNvPr id="3" name="Text Placeholder 2">
             <a:extLst>
               <a:ext uri="{FF2B5EF4-FFF2-40B4-BE49-F238E27FC236}">
-                <a16:creationId xmlns:a16="http://schemas.microsoft.com/office/drawing/2014/main" id="{22E80876-FEA0-4B3C-A221-47AD314F00B6}"/>
+                <a16:creationId xmlns:a16="http://schemas.microsoft.com/office/drawing/2014/main" id="{F83C86E2-0A8D-4EF5-92A1-BEB09233CEC0}"/>
               </a:ext>
             </a:extLst>
           </p:cNvPr>
@@ -1614,7 +1621,7 @@
           <p:cNvPr id="4" name="Content Placeholder 3">
             <a:extLst>
               <a:ext uri="{FF2B5EF4-FFF2-40B4-BE49-F238E27FC236}">
-                <a16:creationId xmlns:a16="http://schemas.microsoft.com/office/drawing/2014/main" id="{A5179E53-193C-42BC-9786-B0F6D337E021}"/>
+                <a16:creationId xmlns:a16="http://schemas.microsoft.com/office/drawing/2014/main" id="{0642C269-E9B5-4080-85F1-13AD691AC116}"/>
               </a:ext>
             </a:extLst>
           </p:cNvPr>
@@ -1676,7 +1683,7 @@
           <p:cNvPr id="5" name="Text Placeholder 4">
             <a:extLst>
               <a:ext uri="{FF2B5EF4-FFF2-40B4-BE49-F238E27FC236}">
-                <a16:creationId xmlns:a16="http://schemas.microsoft.com/office/drawing/2014/main" id="{C1EB6308-004A-40FA-97E0-A9CD2439EF56}"/>
+                <a16:creationId xmlns:a16="http://schemas.microsoft.com/office/drawing/2014/main" id="{3415747A-0578-4709-B7F3-8306D1AFE4A4}"/>
               </a:ext>
             </a:extLst>
           </p:cNvPr>
@@ -1747,7 +1754,7 @@
           <p:cNvPr id="6" name="Content Placeholder 5">
             <a:extLst>
               <a:ext uri="{FF2B5EF4-FFF2-40B4-BE49-F238E27FC236}">
-                <a16:creationId xmlns:a16="http://schemas.microsoft.com/office/drawing/2014/main" id="{9F1FFD54-BD98-4414-82D5-CAF8BE9F6907}"/>
+                <a16:creationId xmlns:a16="http://schemas.microsoft.com/office/drawing/2014/main" id="{D9F497D3-3F93-4B3C-BE1F-27E890CCB4FE}"/>
               </a:ext>
             </a:extLst>
           </p:cNvPr>
@@ -1809,7 +1816,7 @@
           <p:cNvPr id="7" name="Date Placeholder 6">
             <a:extLst>
               <a:ext uri="{FF2B5EF4-FFF2-40B4-BE49-F238E27FC236}">
-                <a16:creationId xmlns:a16="http://schemas.microsoft.com/office/drawing/2014/main" id="{F6E5757A-2887-4324-AC5A-74AA3FD6F87B}"/>
+                <a16:creationId xmlns:a16="http://schemas.microsoft.com/office/drawing/2014/main" id="{3BC7DFFB-12E5-4EAC-B3F8-AC88C2CF5846}"/>
               </a:ext>
             </a:extLst>
           </p:cNvPr>
@@ -1827,7 +1834,7 @@
           <a:p>
             <a:fld id="{E12641E5-F56E-4059-B0E7-6FA6A75637F3}" type="datetimeFigureOut">
               <a:rPr lang="en-US" smtClean="0"/>
-              <a:t>11/5/2019</a:t>
+              <a:t>11/13/2019</a:t>
             </a:fld>
             <a:endParaRPr lang="en-US"/>
           </a:p>
@@ -1838,7 +1845,7 @@
           <p:cNvPr id="8" name="Footer Placeholder 7">
             <a:extLst>
               <a:ext uri="{FF2B5EF4-FFF2-40B4-BE49-F238E27FC236}">
-                <a16:creationId xmlns:a16="http://schemas.microsoft.com/office/drawing/2014/main" id="{2DDEB4E1-3027-42CF-B834-B7FEE0178887}"/>
+                <a16:creationId xmlns:a16="http://schemas.microsoft.com/office/drawing/2014/main" id="{6216A8D1-C08A-4E8A-B49C-9255D1C3513A}"/>
               </a:ext>
             </a:extLst>
           </p:cNvPr>
@@ -1863,7 +1870,7 @@
           <p:cNvPr id="9" name="Slide Number Placeholder 8">
             <a:extLst>
               <a:ext uri="{FF2B5EF4-FFF2-40B4-BE49-F238E27FC236}">
-                <a16:creationId xmlns:a16="http://schemas.microsoft.com/office/drawing/2014/main" id="{8737FE5C-657C-446B-9314-ECD275968E62}"/>
+                <a16:creationId xmlns:a16="http://schemas.microsoft.com/office/drawing/2014/main" id="{7A192DC0-4889-4C42-AE9D-3ACBEB12C9AE}"/>
               </a:ext>
             </a:extLst>
           </p:cNvPr>
@@ -1890,7 +1897,7 @@
     </p:spTree>
     <p:extLst>
       <p:ext uri="{BB962C8B-B14F-4D97-AF65-F5344CB8AC3E}">
-        <p14:creationId xmlns:p14="http://schemas.microsoft.com/office/powerpoint/2010/main" val="4079923943"/>
+        <p14:creationId xmlns:p14="http://schemas.microsoft.com/office/powerpoint/2010/main" val="1145736275"/>
       </p:ext>
     </p:extLst>
   </p:cSld>
@@ -1922,7 +1929,7 @@
           <p:cNvPr id="2" name="Title 1">
             <a:extLst>
               <a:ext uri="{FF2B5EF4-FFF2-40B4-BE49-F238E27FC236}">
-                <a16:creationId xmlns:a16="http://schemas.microsoft.com/office/drawing/2014/main" id="{6038BBF6-A6AA-46C9-818E-CD51E31C7FE0}"/>
+                <a16:creationId xmlns:a16="http://schemas.microsoft.com/office/drawing/2014/main" id="{9E71F2E5-9E45-47F8-B89A-F90F7896CE3C}"/>
               </a:ext>
             </a:extLst>
           </p:cNvPr>
@@ -1950,7 +1957,7 @@
           <p:cNvPr id="3" name="Date Placeholder 2">
             <a:extLst>
               <a:ext uri="{FF2B5EF4-FFF2-40B4-BE49-F238E27FC236}">
-                <a16:creationId xmlns:a16="http://schemas.microsoft.com/office/drawing/2014/main" id="{CBF20005-9714-4C39-A29B-38A12041FF5D}"/>
+                <a16:creationId xmlns:a16="http://schemas.microsoft.com/office/drawing/2014/main" id="{AC4ACA37-0CE7-4F86-B32A-5412BC98115D}"/>
               </a:ext>
             </a:extLst>
           </p:cNvPr>
@@ -1968,7 +1975,7 @@
           <a:p>
             <a:fld id="{E12641E5-F56E-4059-B0E7-6FA6A75637F3}" type="datetimeFigureOut">
               <a:rPr lang="en-US" smtClean="0"/>
-              <a:t>11/5/2019</a:t>
+              <a:t>11/13/2019</a:t>
             </a:fld>
             <a:endParaRPr lang="en-US"/>
           </a:p>
@@ -1979,7 +1986,7 @@
           <p:cNvPr id="4" name="Footer Placeholder 3">
             <a:extLst>
               <a:ext uri="{FF2B5EF4-FFF2-40B4-BE49-F238E27FC236}">
-                <a16:creationId xmlns:a16="http://schemas.microsoft.com/office/drawing/2014/main" id="{98F0FBCA-6951-4490-9F00-0BFB7F1A675F}"/>
+                <a16:creationId xmlns:a16="http://schemas.microsoft.com/office/drawing/2014/main" id="{77A0D2BB-15F8-4D58-AB18-613FA0587F70}"/>
               </a:ext>
             </a:extLst>
           </p:cNvPr>
@@ -2004,7 +2011,7 @@
           <p:cNvPr id="5" name="Slide Number Placeholder 4">
             <a:extLst>
               <a:ext uri="{FF2B5EF4-FFF2-40B4-BE49-F238E27FC236}">
-                <a16:creationId xmlns:a16="http://schemas.microsoft.com/office/drawing/2014/main" id="{B5A0BB6C-3D50-48D7-9376-B0F2EA06156F}"/>
+                <a16:creationId xmlns:a16="http://schemas.microsoft.com/office/drawing/2014/main" id="{E6245553-E080-4AB8-B3FF-7C0375F09F88}"/>
               </a:ext>
             </a:extLst>
           </p:cNvPr>
@@ -2031,7 +2038,7 @@
     </p:spTree>
     <p:extLst>
       <p:ext uri="{BB962C8B-B14F-4D97-AF65-F5344CB8AC3E}">
-        <p14:creationId xmlns:p14="http://schemas.microsoft.com/office/powerpoint/2010/main" val="2413498239"/>
+        <p14:creationId xmlns:p14="http://schemas.microsoft.com/office/powerpoint/2010/main" val="1278679752"/>
       </p:ext>
     </p:extLst>
   </p:cSld>
@@ -2063,7 +2070,7 @@
           <p:cNvPr id="2" name="Date Placeholder 1">
             <a:extLst>
               <a:ext uri="{FF2B5EF4-FFF2-40B4-BE49-F238E27FC236}">
-                <a16:creationId xmlns:a16="http://schemas.microsoft.com/office/drawing/2014/main" id="{4CD29944-EA61-43BC-89C3-5E49C2ED980F}"/>
+                <a16:creationId xmlns:a16="http://schemas.microsoft.com/office/drawing/2014/main" id="{BAC7DCBD-EC83-47C6-922C-2E7F7F8D18A3}"/>
               </a:ext>
             </a:extLst>
           </p:cNvPr>
@@ -2081,7 +2088,7 @@
           <a:p>
             <a:fld id="{E12641E5-F56E-4059-B0E7-6FA6A75637F3}" type="datetimeFigureOut">
               <a:rPr lang="en-US" smtClean="0"/>
-              <a:t>11/5/2019</a:t>
+              <a:t>11/13/2019</a:t>
             </a:fld>
             <a:endParaRPr lang="en-US"/>
           </a:p>
@@ -2092,7 +2099,7 @@
           <p:cNvPr id="3" name="Footer Placeholder 2">
             <a:extLst>
               <a:ext uri="{FF2B5EF4-FFF2-40B4-BE49-F238E27FC236}">
-                <a16:creationId xmlns:a16="http://schemas.microsoft.com/office/drawing/2014/main" id="{7E17FEDB-D944-4404-9C6C-C6CB0CAD7707}"/>
+                <a16:creationId xmlns:a16="http://schemas.microsoft.com/office/drawing/2014/main" id="{DC7A8150-2511-4B89-B9F5-C1089C97E670}"/>
               </a:ext>
             </a:extLst>
           </p:cNvPr>
@@ -2117,7 +2124,7 @@
           <p:cNvPr id="4" name="Slide Number Placeholder 3">
             <a:extLst>
               <a:ext uri="{FF2B5EF4-FFF2-40B4-BE49-F238E27FC236}">
-                <a16:creationId xmlns:a16="http://schemas.microsoft.com/office/drawing/2014/main" id="{5A982BA1-302B-4B25-B2CF-B06F30526038}"/>
+                <a16:creationId xmlns:a16="http://schemas.microsoft.com/office/drawing/2014/main" id="{F7DB7902-F93A-4A3B-8EBF-2622214781D7}"/>
               </a:ext>
             </a:extLst>
           </p:cNvPr>
@@ -2144,7 +2151,7 @@
     </p:spTree>
     <p:extLst>
       <p:ext uri="{BB962C8B-B14F-4D97-AF65-F5344CB8AC3E}">
-        <p14:creationId xmlns:p14="http://schemas.microsoft.com/office/powerpoint/2010/main" val="821551790"/>
+        <p14:creationId xmlns:p14="http://schemas.microsoft.com/office/powerpoint/2010/main" val="54450587"/>
       </p:ext>
     </p:extLst>
   </p:cSld>
@@ -2176,7 +2183,7 @@
           <p:cNvPr id="2" name="Title 1">
             <a:extLst>
               <a:ext uri="{FF2B5EF4-FFF2-40B4-BE49-F238E27FC236}">
-                <a16:creationId xmlns:a16="http://schemas.microsoft.com/office/drawing/2014/main" id="{6A7D5ACA-0F63-4BD7-AA5B-F01637C08F49}"/>
+                <a16:creationId xmlns:a16="http://schemas.microsoft.com/office/drawing/2014/main" id="{C2AC3840-6C03-4A9D-A1F6-5E2162D877E5}"/>
               </a:ext>
             </a:extLst>
           </p:cNvPr>
@@ -2213,7 +2220,7 @@
           <p:cNvPr id="3" name="Content Placeholder 2">
             <a:extLst>
               <a:ext uri="{FF2B5EF4-FFF2-40B4-BE49-F238E27FC236}">
-                <a16:creationId xmlns:a16="http://schemas.microsoft.com/office/drawing/2014/main" id="{1CEA947C-BD4B-42BF-A55E-9A66610B8108}"/>
+                <a16:creationId xmlns:a16="http://schemas.microsoft.com/office/drawing/2014/main" id="{5CCA8153-E73F-48AD-90B5-9D6457F03144}"/>
               </a:ext>
             </a:extLst>
           </p:cNvPr>
@@ -2303,7 +2310,7 @@
           <p:cNvPr id="4" name="Text Placeholder 3">
             <a:extLst>
               <a:ext uri="{FF2B5EF4-FFF2-40B4-BE49-F238E27FC236}">
-                <a16:creationId xmlns:a16="http://schemas.microsoft.com/office/drawing/2014/main" id="{7D355839-24CC-4C0B-84EC-95B64B6905C2}"/>
+                <a16:creationId xmlns:a16="http://schemas.microsoft.com/office/drawing/2014/main" id="{4394DD25-4853-46E1-9529-B4625F57D283}"/>
               </a:ext>
             </a:extLst>
           </p:cNvPr>
@@ -2374,7 +2381,7 @@
           <p:cNvPr id="5" name="Date Placeholder 4">
             <a:extLst>
               <a:ext uri="{FF2B5EF4-FFF2-40B4-BE49-F238E27FC236}">
-                <a16:creationId xmlns:a16="http://schemas.microsoft.com/office/drawing/2014/main" id="{3684362C-8E46-4564-A960-BC9F001675B1}"/>
+                <a16:creationId xmlns:a16="http://schemas.microsoft.com/office/drawing/2014/main" id="{93DD1CF6-52A2-4786-BB50-17A5D2D9C47F}"/>
               </a:ext>
             </a:extLst>
           </p:cNvPr>
@@ -2392,7 +2399,7 @@
           <a:p>
             <a:fld id="{E12641E5-F56E-4059-B0E7-6FA6A75637F3}" type="datetimeFigureOut">
               <a:rPr lang="en-US" smtClean="0"/>
-              <a:t>11/5/2019</a:t>
+              <a:t>11/13/2019</a:t>
             </a:fld>
             <a:endParaRPr lang="en-US"/>
           </a:p>
@@ -2403,7 +2410,7 @@
           <p:cNvPr id="6" name="Footer Placeholder 5">
             <a:extLst>
               <a:ext uri="{FF2B5EF4-FFF2-40B4-BE49-F238E27FC236}">
-                <a16:creationId xmlns:a16="http://schemas.microsoft.com/office/drawing/2014/main" id="{BD210C81-649E-4774-9B15-88183F83E721}"/>
+                <a16:creationId xmlns:a16="http://schemas.microsoft.com/office/drawing/2014/main" id="{8133EC04-956C-47E3-AE48-51D7C92E9665}"/>
               </a:ext>
             </a:extLst>
           </p:cNvPr>
@@ -2428,7 +2435,7 @@
           <p:cNvPr id="7" name="Slide Number Placeholder 6">
             <a:extLst>
               <a:ext uri="{FF2B5EF4-FFF2-40B4-BE49-F238E27FC236}">
-                <a16:creationId xmlns:a16="http://schemas.microsoft.com/office/drawing/2014/main" id="{6895A041-2A25-43B6-8C76-05BC58BD1411}"/>
+                <a16:creationId xmlns:a16="http://schemas.microsoft.com/office/drawing/2014/main" id="{4D7A5382-2780-45E4-8C50-455AEFD8F2E8}"/>
               </a:ext>
             </a:extLst>
           </p:cNvPr>
@@ -2455,7 +2462,7 @@
     </p:spTree>
     <p:extLst>
       <p:ext uri="{BB962C8B-B14F-4D97-AF65-F5344CB8AC3E}">
-        <p14:creationId xmlns:p14="http://schemas.microsoft.com/office/powerpoint/2010/main" val="3066019206"/>
+        <p14:creationId xmlns:p14="http://schemas.microsoft.com/office/powerpoint/2010/main" val="3541545661"/>
       </p:ext>
     </p:extLst>
   </p:cSld>
@@ -2487,7 +2494,7 @@
           <p:cNvPr id="2" name="Title 1">
             <a:extLst>
               <a:ext uri="{FF2B5EF4-FFF2-40B4-BE49-F238E27FC236}">
-                <a16:creationId xmlns:a16="http://schemas.microsoft.com/office/drawing/2014/main" id="{5BF9BAD7-4B17-4BA4-987B-4A61F944593C}"/>
+                <a16:creationId xmlns:a16="http://schemas.microsoft.com/office/drawing/2014/main" id="{4CF6020C-9E2E-4F25-A1D2-8B758DD28924}"/>
               </a:ext>
             </a:extLst>
           </p:cNvPr>
@@ -2524,7 +2531,7 @@
           <p:cNvPr id="3" name="Picture Placeholder 2">
             <a:extLst>
               <a:ext uri="{FF2B5EF4-FFF2-40B4-BE49-F238E27FC236}">
-                <a16:creationId xmlns:a16="http://schemas.microsoft.com/office/drawing/2014/main" id="{F6730C43-C8DD-4706-8924-F453BCD75832}"/>
+                <a16:creationId xmlns:a16="http://schemas.microsoft.com/office/drawing/2014/main" id="{8C783606-89C2-41BC-B6B3-23C7D1DCED9F}"/>
               </a:ext>
             </a:extLst>
           </p:cNvPr>
@@ -2591,7 +2598,7 @@
           <p:cNvPr id="4" name="Text Placeholder 3">
             <a:extLst>
               <a:ext uri="{FF2B5EF4-FFF2-40B4-BE49-F238E27FC236}">
-                <a16:creationId xmlns:a16="http://schemas.microsoft.com/office/drawing/2014/main" id="{A7939BBE-FA3C-4FE0-A9D1-51B0FA293099}"/>
+                <a16:creationId xmlns:a16="http://schemas.microsoft.com/office/drawing/2014/main" id="{004B9CB5-0A12-426C-9704-7AFCB366F715}"/>
               </a:ext>
             </a:extLst>
           </p:cNvPr>
@@ -2662,7 +2669,7 @@
           <p:cNvPr id="5" name="Date Placeholder 4">
             <a:extLst>
               <a:ext uri="{FF2B5EF4-FFF2-40B4-BE49-F238E27FC236}">
-                <a16:creationId xmlns:a16="http://schemas.microsoft.com/office/drawing/2014/main" id="{447084BC-60DB-47CE-B76D-8FE3569AFA58}"/>
+                <a16:creationId xmlns:a16="http://schemas.microsoft.com/office/drawing/2014/main" id="{494A6B13-DD43-47DB-8988-B3A40A49DD6E}"/>
               </a:ext>
             </a:extLst>
           </p:cNvPr>
@@ -2680,7 +2687,7 @@
           <a:p>
             <a:fld id="{E12641E5-F56E-4059-B0E7-6FA6A75637F3}" type="datetimeFigureOut">
               <a:rPr lang="en-US" smtClean="0"/>
-              <a:t>11/5/2019</a:t>
+              <a:t>11/13/2019</a:t>
             </a:fld>
             <a:endParaRPr lang="en-US"/>
           </a:p>
@@ -2691,7 +2698,7 @@
           <p:cNvPr id="6" name="Footer Placeholder 5">
             <a:extLst>
               <a:ext uri="{FF2B5EF4-FFF2-40B4-BE49-F238E27FC236}">
-                <a16:creationId xmlns:a16="http://schemas.microsoft.com/office/drawing/2014/main" id="{8FCA5B6A-0A72-4978-A328-ECA967D722E5}"/>
+                <a16:creationId xmlns:a16="http://schemas.microsoft.com/office/drawing/2014/main" id="{7DE4F3AF-349D-4071-9B71-CC45B0AA430D}"/>
               </a:ext>
             </a:extLst>
           </p:cNvPr>
@@ -2716,7 +2723,7 @@
           <p:cNvPr id="7" name="Slide Number Placeholder 6">
             <a:extLst>
               <a:ext uri="{FF2B5EF4-FFF2-40B4-BE49-F238E27FC236}">
-                <a16:creationId xmlns:a16="http://schemas.microsoft.com/office/drawing/2014/main" id="{C3F92AB7-E822-4EED-81B1-CC85EEF500B3}"/>
+                <a16:creationId xmlns:a16="http://schemas.microsoft.com/office/drawing/2014/main" id="{5F8F5F24-91B8-4D86-9F89-6D0EADD38BBE}"/>
               </a:ext>
             </a:extLst>
           </p:cNvPr>
@@ -2743,7 +2750,7 @@
     </p:spTree>
     <p:extLst>
       <p:ext uri="{BB962C8B-B14F-4D97-AF65-F5344CB8AC3E}">
-        <p14:creationId xmlns:p14="http://schemas.microsoft.com/office/powerpoint/2010/main" val="336861236"/>
+        <p14:creationId xmlns:p14="http://schemas.microsoft.com/office/powerpoint/2010/main" val="1126893862"/>
       </p:ext>
     </p:extLst>
   </p:cSld>
@@ -2780,7 +2787,7 @@
           <p:cNvPr id="2" name="Title Placeholder 1">
             <a:extLst>
               <a:ext uri="{FF2B5EF4-FFF2-40B4-BE49-F238E27FC236}">
-                <a16:creationId xmlns:a16="http://schemas.microsoft.com/office/drawing/2014/main" id="{6FA8F653-6492-4501-92BA-4C32C204EF17}"/>
+                <a16:creationId xmlns:a16="http://schemas.microsoft.com/office/drawing/2014/main" id="{2BC95B30-0127-4467-B715-42CBBDCB55B7}"/>
               </a:ext>
             </a:extLst>
           </p:cNvPr>
@@ -2818,7 +2825,7 @@
           <p:cNvPr id="3" name="Text Placeholder 2">
             <a:extLst>
               <a:ext uri="{FF2B5EF4-FFF2-40B4-BE49-F238E27FC236}">
-                <a16:creationId xmlns:a16="http://schemas.microsoft.com/office/drawing/2014/main" id="{F08DFDE3-618B-4775-AC4C-EC76CDB13191}"/>
+                <a16:creationId xmlns:a16="http://schemas.microsoft.com/office/drawing/2014/main" id="{402C3AEC-E998-423A-B389-2512AD721B5E}"/>
               </a:ext>
             </a:extLst>
           </p:cNvPr>
@@ -2885,7 +2892,7 @@
           <p:cNvPr id="4" name="Date Placeholder 3">
             <a:extLst>
               <a:ext uri="{FF2B5EF4-FFF2-40B4-BE49-F238E27FC236}">
-                <a16:creationId xmlns:a16="http://schemas.microsoft.com/office/drawing/2014/main" id="{4ACA2242-E30C-4678-AF00-26F26726A7BB}"/>
+                <a16:creationId xmlns:a16="http://schemas.microsoft.com/office/drawing/2014/main" id="{D1D1EDC6-9A80-49C0-A46F-959DA11CF906}"/>
               </a:ext>
             </a:extLst>
           </p:cNvPr>
@@ -2921,7 +2928,7 @@
           <a:p>
             <a:fld id="{E12641E5-F56E-4059-B0E7-6FA6A75637F3}" type="datetimeFigureOut">
               <a:rPr lang="en-US" smtClean="0"/>
-              <a:t>11/5/2019</a:t>
+              <a:t>11/13/2019</a:t>
             </a:fld>
             <a:endParaRPr lang="en-US"/>
           </a:p>
@@ -2932,7 +2939,7 @@
           <p:cNvPr id="5" name="Footer Placeholder 4">
             <a:extLst>
               <a:ext uri="{FF2B5EF4-FFF2-40B4-BE49-F238E27FC236}">
-                <a16:creationId xmlns:a16="http://schemas.microsoft.com/office/drawing/2014/main" id="{12DD3BC3-DC3F-4665-B68A-2FEF1447B87C}"/>
+                <a16:creationId xmlns:a16="http://schemas.microsoft.com/office/drawing/2014/main" id="{6F100002-8FDB-4A0E-9078-8B2C436F8B89}"/>
               </a:ext>
             </a:extLst>
           </p:cNvPr>
@@ -2975,7 +2982,7 @@
           <p:cNvPr id="6" name="Slide Number Placeholder 5">
             <a:extLst>
               <a:ext uri="{FF2B5EF4-FFF2-40B4-BE49-F238E27FC236}">
-                <a16:creationId xmlns:a16="http://schemas.microsoft.com/office/drawing/2014/main" id="{01679789-8DA8-4C96-971D-C53C9CA137F6}"/>
+                <a16:creationId xmlns:a16="http://schemas.microsoft.com/office/drawing/2014/main" id="{B2A9972F-3290-4322-A2AD-9FCBFD36DB01}"/>
               </a:ext>
             </a:extLst>
           </p:cNvPr>
@@ -3020,23 +3027,23 @@
     </p:spTree>
     <p:extLst>
       <p:ext uri="{BB962C8B-B14F-4D97-AF65-F5344CB8AC3E}">
-        <p14:creationId xmlns:p14="http://schemas.microsoft.com/office/powerpoint/2010/main" val="393007502"/>
+        <p14:creationId xmlns:p14="http://schemas.microsoft.com/office/powerpoint/2010/main" val="1575140423"/>
       </p:ext>
     </p:extLst>
   </p:cSld>
   <p:clrMap bg1="lt1" tx1="dk1" bg2="lt2" tx2="dk2" accent1="accent1" accent2="accent2" accent3="accent3" accent4="accent4" accent5="accent5" accent6="accent6" hlink="hlink" folHlink="folHlink"/>
   <p:sldLayoutIdLst>
-    <p:sldLayoutId id="2147483649" r:id="rId1"/>
-    <p:sldLayoutId id="2147483650" r:id="rId2"/>
-    <p:sldLayoutId id="2147483651" r:id="rId3"/>
-    <p:sldLayoutId id="2147483652" r:id="rId4"/>
-    <p:sldLayoutId id="2147483653" r:id="rId5"/>
-    <p:sldLayoutId id="2147483654" r:id="rId6"/>
-    <p:sldLayoutId id="2147483655" r:id="rId7"/>
-    <p:sldLayoutId id="2147483656" r:id="rId8"/>
-    <p:sldLayoutId id="2147483657" r:id="rId9"/>
-    <p:sldLayoutId id="2147483658" r:id="rId10"/>
-    <p:sldLayoutId id="2147483659" r:id="rId11"/>
+    <p:sldLayoutId id="2147483673" r:id="rId1"/>
+    <p:sldLayoutId id="2147483674" r:id="rId2"/>
+    <p:sldLayoutId id="2147483675" r:id="rId3"/>
+    <p:sldLayoutId id="2147483676" r:id="rId4"/>
+    <p:sldLayoutId id="2147483677" r:id="rId5"/>
+    <p:sldLayoutId id="2147483678" r:id="rId6"/>
+    <p:sldLayoutId id="2147483679" r:id="rId7"/>
+    <p:sldLayoutId id="2147483680" r:id="rId8"/>
+    <p:sldLayoutId id="2147483681" r:id="rId9"/>
+    <p:sldLayoutId id="2147483682" r:id="rId10"/>
+    <p:sldLayoutId id="2147483683" r:id="rId11"/>
   </p:sldLayoutIdLst>
   <p:txStyles>
     <p:titleStyle>
@@ -3354,13 +3361,27 @@
             <p:ph type="ctrTitle"/>
           </p:nvPr>
         </p:nvSpPr>
-        <p:spPr/>
-        <p:txBody>
-          <a:bodyPr/>
-          <a:lstStyle/>
-          <a:p>
-            <a:r>
-              <a:rPr lang="en-US" dirty="0"/>
+        <p:spPr>
+          <a:xfrm>
+            <a:off x="841248" y="581891"/>
+            <a:ext cx="3363242" cy="3740727"/>
+          </a:xfrm>
+        </p:spPr>
+        <p:txBody>
+          <a:bodyPr>
+            <a:normAutofit/>
+          </a:bodyPr>
+          <a:lstStyle/>
+          <a:p>
+            <a:pPr algn="l"/>
+            <a:r>
+              <a:rPr lang="en-US" sz="4800" dirty="0">
+                <a:solidFill>
+                  <a:schemeClr val="accent1">
+                    <a:lumMod val="50000"/>
+                  </a:schemeClr>
+                </a:solidFill>
+              </a:rPr>
               <a:t>Proposal for quantifying wounding response</a:t>
             </a:r>
           </a:p>
@@ -3382,11 +3403,19 @@
             <p:ph type="subTitle" idx="1"/>
           </p:nvPr>
         </p:nvSpPr>
-        <p:spPr/>
-        <p:txBody>
-          <a:bodyPr/>
-          <a:lstStyle/>
-          <a:p>
+        <p:spPr>
+          <a:xfrm>
+            <a:off x="841248" y="4533020"/>
+            <a:ext cx="3363242" cy="1612930"/>
+          </a:xfrm>
+        </p:spPr>
+        <p:txBody>
+          <a:bodyPr>
+            <a:normAutofit/>
+          </a:bodyPr>
+          <a:lstStyle/>
+          <a:p>
+            <a:pPr algn="l"/>
             <a:r>
               <a:rPr lang="en-US" dirty="0"/>
               <a:t>Bryce Askey</a:t>
@@ -3394,6 +3423,42 @@
           </a:p>
         </p:txBody>
       </p:sp>
+      <p:pic>
+        <p:nvPicPr>
+          <p:cNvPr id="5" name="Picture 4" descr="A picture containing food&#10;&#10;Description automatically generated">
+            <a:extLst>
+              <a:ext uri="{FF2B5EF4-FFF2-40B4-BE49-F238E27FC236}">
+                <a16:creationId xmlns:a16="http://schemas.microsoft.com/office/drawing/2014/main" id="{622594EE-7AB9-4605-88A6-2543C9210AA8}"/>
+              </a:ext>
+            </a:extLst>
+          </p:cNvPr>
+          <p:cNvPicPr>
+            <a:picLocks noChangeAspect="1"/>
+          </p:cNvPicPr>
+          <p:nvPr/>
+        </p:nvPicPr>
+        <p:blipFill>
+          <a:blip r:embed="rId2">
+            <a:extLst>
+              <a:ext uri="{28A0092B-C50C-407E-A947-70E740481C1C}">
+                <a14:useLocalDpi xmlns:a14="http://schemas.microsoft.com/office/drawing/2010/main" val="0"/>
+              </a:ext>
+            </a:extLst>
+          </a:blip>
+          <a:stretch>
+            <a:fillRect/>
+          </a:stretch>
+        </p:blipFill>
+        <p:spPr>
+          <a:xfrm rot="16200000">
+            <a:off x="5493510" y="-59611"/>
+            <a:ext cx="5135296" cy="6847062"/>
+          </a:xfrm>
+          <a:prstGeom prst="rect">
+            <a:avLst/>
+          </a:prstGeom>
+        </p:spPr>
+      </p:pic>
     </p:spTree>
     <p:extLst>
       <p:ext uri="{BB962C8B-B14F-4D97-AF65-F5344CB8AC3E}">
@@ -3445,7 +3510,16 @@
           <a:bodyPr/>
           <a:lstStyle/>
           <a:p>
-            <a:endParaRPr lang="en-US"/>
+            <a:r>
+              <a:rPr lang="en-US" dirty="0">
+                <a:solidFill>
+                  <a:schemeClr val="accent1">
+                    <a:lumMod val="50000"/>
+                  </a:schemeClr>
+                </a:solidFill>
+              </a:rPr>
+              <a:t>General approach</a:t>
+            </a:r>
           </a:p>
         </p:txBody>
       </p:sp>
@@ -3465,12 +3539,51 @@
             <p:ph idx="1"/>
           </p:nvPr>
         </p:nvSpPr>
-        <p:spPr/>
-        <p:txBody>
-          <a:bodyPr/>
-          <a:lstStyle/>
-          <a:p>
-            <a:endParaRPr lang="en-US"/>
+        <p:spPr>
+          <a:xfrm>
+            <a:off x="838200" y="1825625"/>
+            <a:ext cx="10401300" cy="4351338"/>
+          </a:xfrm>
+        </p:spPr>
+        <p:txBody>
+          <a:bodyPr/>
+          <a:lstStyle/>
+          <a:p>
+            <a:pPr marL="514350" indent="-514350">
+              <a:buFont typeface="+mj-lt"/>
+              <a:buAutoNum type="arabicPeriod"/>
+            </a:pPr>
+            <a:r>
+              <a:rPr lang="en-US" dirty="0"/>
+              <a:t>Analyze pixel RGB values @ wounding site</a:t>
+            </a:r>
+          </a:p>
+          <a:p>
+            <a:pPr marL="514350" indent="-514350">
+              <a:buFont typeface="+mj-lt"/>
+              <a:buAutoNum type="arabicPeriod"/>
+            </a:pPr>
+            <a:r>
+              <a:rPr lang="en-US" dirty="0"/>
+              <a:t>Use pixels from control treatment to develop RGB pixel threshold</a:t>
+            </a:r>
+          </a:p>
+          <a:p>
+            <a:pPr marL="514350" indent="-514350">
+              <a:buFont typeface="+mj-lt"/>
+              <a:buAutoNum type="arabicPeriod"/>
+            </a:pPr>
+            <a:r>
+              <a:rPr lang="en-US" dirty="0"/>
+              <a:t>Apply threshold to all images to determine % of pink pixels</a:t>
+            </a:r>
+          </a:p>
+          <a:p>
+            <a:pPr marL="514350" indent="-514350">
+              <a:buFont typeface="+mj-lt"/>
+              <a:buAutoNum type="arabicPeriod"/>
+            </a:pPr>
+            <a:endParaRPr lang="en-US" dirty="0"/>
           </a:p>
         </p:txBody>
       </p:sp>
@@ -3478,6 +3591,1275 @@
     <p:extLst>
       <p:ext uri="{BB962C8B-B14F-4D97-AF65-F5344CB8AC3E}">
         <p14:creationId xmlns:p14="http://schemas.microsoft.com/office/powerpoint/2010/main" val="274059172"/>
+      </p:ext>
+    </p:extLst>
+  </p:cSld>
+  <p:clrMapOvr>
+    <a:masterClrMapping/>
+  </p:clrMapOvr>
+</p:sld>
+</file>
+
+<file path=ppt/slides/slide3.xml><?xml version="1.0" encoding="utf-8"?>
+<p:sld xmlns:a="http://schemas.openxmlformats.org/drawingml/2006/main" xmlns:r="http://schemas.openxmlformats.org/officeDocument/2006/relationships" xmlns:p="http://schemas.openxmlformats.org/presentationml/2006/main">
+  <p:cSld>
+    <p:spTree>
+      <p:nvGrpSpPr>
+        <p:cNvPr id="1" name=""/>
+        <p:cNvGrpSpPr/>
+        <p:nvPr/>
+      </p:nvGrpSpPr>
+      <p:grpSpPr>
+        <a:xfrm>
+          <a:off x="0" y="0"/>
+          <a:ext cx="0" cy="0"/>
+          <a:chOff x="0" y="0"/>
+          <a:chExt cx="0" cy="0"/>
+        </a:xfrm>
+      </p:grpSpPr>
+      <p:sp>
+        <p:nvSpPr>
+          <p:cNvPr id="2" name="Title 1">
+            <a:extLst>
+              <a:ext uri="{FF2B5EF4-FFF2-40B4-BE49-F238E27FC236}">
+                <a16:creationId xmlns:a16="http://schemas.microsoft.com/office/drawing/2014/main" id="{59013583-506F-4E28-AA8F-D394ACA42332}"/>
+              </a:ext>
+            </a:extLst>
+          </p:cNvPr>
+          <p:cNvSpPr>
+            <a:spLocks noGrp="1"/>
+          </p:cNvSpPr>
+          <p:nvPr>
+            <p:ph type="title"/>
+          </p:nvPr>
+        </p:nvSpPr>
+        <p:spPr/>
+        <p:txBody>
+          <a:bodyPr/>
+          <a:lstStyle/>
+          <a:p>
+            <a:r>
+              <a:rPr lang="en-US" dirty="0">
+                <a:solidFill>
+                  <a:schemeClr val="accent1">
+                    <a:lumMod val="50000"/>
+                  </a:schemeClr>
+                </a:solidFill>
+              </a:rPr>
+              <a:t>Differences in RGB profiles</a:t>
+            </a:r>
+          </a:p>
+        </p:txBody>
+      </p:sp>
+      <p:pic>
+        <p:nvPicPr>
+          <p:cNvPr id="5" name="Content Placeholder 4" descr="A close up of a map&#10;&#10;Description automatically generated">
+            <a:extLst>
+              <a:ext uri="{FF2B5EF4-FFF2-40B4-BE49-F238E27FC236}">
+                <a16:creationId xmlns:a16="http://schemas.microsoft.com/office/drawing/2014/main" id="{EA989F86-1A3F-4D03-A24F-53F3356E060B}"/>
+              </a:ext>
+            </a:extLst>
+          </p:cNvPr>
+          <p:cNvPicPr>
+            <a:picLocks noGrp="1" noChangeAspect="1"/>
+          </p:cNvPicPr>
+          <p:nvPr>
+            <p:ph idx="1"/>
+          </p:nvPr>
+        </p:nvPicPr>
+        <p:blipFill>
+          <a:blip r:embed="rId2">
+            <a:extLst>
+              <a:ext uri="{28A0092B-C50C-407E-A947-70E740481C1C}">
+                <a14:useLocalDpi xmlns:a14="http://schemas.microsoft.com/office/drawing/2010/main" val="0"/>
+              </a:ext>
+            </a:extLst>
+          </a:blip>
+          <a:stretch>
+            <a:fillRect/>
+          </a:stretch>
+        </p:blipFill>
+        <p:spPr>
+          <a:xfrm>
+            <a:off x="1053673" y="1549138"/>
+            <a:ext cx="10939080" cy="5308862"/>
+          </a:xfrm>
+        </p:spPr>
+      </p:pic>
+      <p:sp>
+        <p:nvSpPr>
+          <p:cNvPr id="6" name="TextBox 5">
+            <a:extLst>
+              <a:ext uri="{FF2B5EF4-FFF2-40B4-BE49-F238E27FC236}">
+                <a16:creationId xmlns:a16="http://schemas.microsoft.com/office/drawing/2014/main" id="{003A2DA5-BFC6-451B-88E7-D25D84B2BFB5}"/>
+              </a:ext>
+            </a:extLst>
+          </p:cNvPr>
+          <p:cNvSpPr txBox="1"/>
+          <p:nvPr/>
+        </p:nvSpPr>
+        <p:spPr>
+          <a:xfrm rot="16200000">
+            <a:off x="-123213" y="2481215"/>
+            <a:ext cx="1106585" cy="461665"/>
+          </a:xfrm>
+          <a:prstGeom prst="rect">
+            <a:avLst/>
+          </a:prstGeom>
+          <a:noFill/>
+        </p:spPr>
+        <p:txBody>
+          <a:bodyPr wrap="none" rtlCol="0">
+            <a:spAutoFit/>
+          </a:bodyPr>
+          <a:lstStyle/>
+          <a:p>
+            <a:r>
+              <a:rPr lang="en-US" sz="2400" dirty="0"/>
+              <a:t>Control</a:t>
+            </a:r>
+          </a:p>
+        </p:txBody>
+      </p:sp>
+      <p:sp>
+        <p:nvSpPr>
+          <p:cNvPr id="7" name="TextBox 6">
+            <a:extLst>
+              <a:ext uri="{FF2B5EF4-FFF2-40B4-BE49-F238E27FC236}">
+                <a16:creationId xmlns:a16="http://schemas.microsoft.com/office/drawing/2014/main" id="{78A370AC-53D4-4986-8949-CE81C946F812}"/>
+              </a:ext>
+            </a:extLst>
+          </p:cNvPr>
+          <p:cNvSpPr txBox="1"/>
+          <p:nvPr/>
+        </p:nvSpPr>
+        <p:spPr>
+          <a:xfrm rot="16200000">
+            <a:off x="-641331" y="4893364"/>
+            <a:ext cx="2142822" cy="830997"/>
+          </a:xfrm>
+          <a:prstGeom prst="rect">
+            <a:avLst/>
+          </a:prstGeom>
+          <a:noFill/>
+        </p:spPr>
+        <p:txBody>
+          <a:bodyPr wrap="square" rtlCol="0">
+            <a:spAutoFit/>
+          </a:bodyPr>
+          <a:lstStyle/>
+          <a:p>
+            <a:pPr algn="ctr"/>
+            <a:r>
+              <a:rPr lang="en-US" sz="2400" dirty="0"/>
+              <a:t>Melatonin 1000 ppm</a:t>
+            </a:r>
+          </a:p>
+        </p:txBody>
+      </p:sp>
+    </p:spTree>
+    <p:extLst>
+      <p:ext uri="{BB962C8B-B14F-4D97-AF65-F5344CB8AC3E}">
+        <p14:creationId xmlns:p14="http://schemas.microsoft.com/office/powerpoint/2010/main" val="1963568647"/>
+      </p:ext>
+    </p:extLst>
+  </p:cSld>
+  <p:clrMapOvr>
+    <a:masterClrMapping/>
+  </p:clrMapOvr>
+</p:sld>
+</file>
+
+<file path=ppt/slides/slide4.xml><?xml version="1.0" encoding="utf-8"?>
+<p:sld xmlns:a="http://schemas.openxmlformats.org/drawingml/2006/main" xmlns:r="http://schemas.openxmlformats.org/officeDocument/2006/relationships" xmlns:p="http://schemas.openxmlformats.org/presentationml/2006/main">
+  <p:cSld>
+    <p:spTree>
+      <p:nvGrpSpPr>
+        <p:cNvPr id="1" name=""/>
+        <p:cNvGrpSpPr/>
+        <p:nvPr/>
+      </p:nvGrpSpPr>
+      <p:grpSpPr>
+        <a:xfrm>
+          <a:off x="0" y="0"/>
+          <a:ext cx="0" cy="0"/>
+          <a:chOff x="0" y="0"/>
+          <a:chExt cx="0" cy="0"/>
+        </a:xfrm>
+      </p:grpSpPr>
+      <p:sp>
+        <p:nvSpPr>
+          <p:cNvPr id="2" name="Title 1">
+            <a:extLst>
+              <a:ext uri="{FF2B5EF4-FFF2-40B4-BE49-F238E27FC236}">
+                <a16:creationId xmlns:a16="http://schemas.microsoft.com/office/drawing/2014/main" id="{59013583-506F-4E28-AA8F-D394ACA42332}"/>
+              </a:ext>
+            </a:extLst>
+          </p:cNvPr>
+          <p:cNvSpPr>
+            <a:spLocks noGrp="1"/>
+          </p:cNvSpPr>
+          <p:nvPr>
+            <p:ph type="title"/>
+          </p:nvPr>
+        </p:nvSpPr>
+        <p:spPr/>
+        <p:txBody>
+          <a:bodyPr/>
+          <a:lstStyle/>
+          <a:p>
+            <a:r>
+              <a:rPr lang="en-US" dirty="0">
+                <a:solidFill>
+                  <a:schemeClr val="accent1">
+                    <a:lumMod val="50000"/>
+                  </a:schemeClr>
+                </a:solidFill>
+              </a:rPr>
+              <a:t>Threshold RGB values for pinking</a:t>
+            </a:r>
+          </a:p>
+        </p:txBody>
+      </p:sp>
+      <p:pic>
+        <p:nvPicPr>
+          <p:cNvPr id="5" name="Picture 4" descr="A close up of a map&#10;&#10;Description automatically generated">
+            <a:extLst>
+              <a:ext uri="{FF2B5EF4-FFF2-40B4-BE49-F238E27FC236}">
+                <a16:creationId xmlns:a16="http://schemas.microsoft.com/office/drawing/2014/main" id="{E101A361-0FD5-44C7-B80D-760B2E4073F4}"/>
+              </a:ext>
+            </a:extLst>
+          </p:cNvPr>
+          <p:cNvPicPr>
+            <a:picLocks noChangeAspect="1"/>
+          </p:cNvPicPr>
+          <p:nvPr/>
+        </p:nvPicPr>
+        <p:blipFill>
+          <a:blip r:embed="rId2">
+            <a:extLst>
+              <a:ext uri="{28A0092B-C50C-407E-A947-70E740481C1C}">
+                <a14:useLocalDpi xmlns:a14="http://schemas.microsoft.com/office/drawing/2010/main" val="0"/>
+              </a:ext>
+            </a:extLst>
+          </a:blip>
+          <a:stretch>
+            <a:fillRect/>
+          </a:stretch>
+        </p:blipFill>
+        <p:spPr>
+          <a:xfrm>
+            <a:off x="209370" y="1899032"/>
+            <a:ext cx="11588063" cy="4302629"/>
+          </a:xfrm>
+          <a:prstGeom prst="rect">
+            <a:avLst/>
+          </a:prstGeom>
+        </p:spPr>
+      </p:pic>
+    </p:spTree>
+    <p:extLst>
+      <p:ext uri="{BB962C8B-B14F-4D97-AF65-F5344CB8AC3E}">
+        <p14:creationId xmlns:p14="http://schemas.microsoft.com/office/powerpoint/2010/main" val="3331117077"/>
+      </p:ext>
+    </p:extLst>
+  </p:cSld>
+  <p:clrMapOvr>
+    <a:masterClrMapping/>
+  </p:clrMapOvr>
+</p:sld>
+</file>
+
+<file path=ppt/slides/slide5.xml><?xml version="1.0" encoding="utf-8"?>
+<p:sld xmlns:a="http://schemas.openxmlformats.org/drawingml/2006/main" xmlns:r="http://schemas.openxmlformats.org/officeDocument/2006/relationships" xmlns:p="http://schemas.openxmlformats.org/presentationml/2006/main">
+  <p:cSld>
+    <p:spTree>
+      <p:nvGrpSpPr>
+        <p:cNvPr id="1" name=""/>
+        <p:cNvGrpSpPr/>
+        <p:nvPr/>
+      </p:nvGrpSpPr>
+      <p:grpSpPr>
+        <a:xfrm>
+          <a:off x="0" y="0"/>
+          <a:ext cx="0" cy="0"/>
+          <a:chOff x="0" y="0"/>
+          <a:chExt cx="0" cy="0"/>
+        </a:xfrm>
+      </p:grpSpPr>
+      <p:sp>
+        <p:nvSpPr>
+          <p:cNvPr id="2" name="Title 1">
+            <a:extLst>
+              <a:ext uri="{FF2B5EF4-FFF2-40B4-BE49-F238E27FC236}">
+                <a16:creationId xmlns:a16="http://schemas.microsoft.com/office/drawing/2014/main" id="{59013583-506F-4E28-AA8F-D394ACA42332}"/>
+              </a:ext>
+            </a:extLst>
+          </p:cNvPr>
+          <p:cNvSpPr>
+            <a:spLocks noGrp="1"/>
+          </p:cNvSpPr>
+          <p:nvPr>
+            <p:ph type="title"/>
+          </p:nvPr>
+        </p:nvSpPr>
+        <p:spPr/>
+        <p:txBody>
+          <a:bodyPr/>
+          <a:lstStyle/>
+          <a:p>
+            <a:r>
+              <a:rPr lang="en-US" dirty="0">
+                <a:solidFill>
+                  <a:schemeClr val="accent1">
+                    <a:lumMod val="50000"/>
+                  </a:schemeClr>
+                </a:solidFill>
+              </a:rPr>
+              <a:t>Quantifying pinking response</a:t>
+            </a:r>
+          </a:p>
+        </p:txBody>
+      </p:sp>
+      <p:pic>
+        <p:nvPicPr>
+          <p:cNvPr id="15" name="Picture 14" descr="A picture containing food&#10;&#10;Description automatically generated">
+            <a:extLst>
+              <a:ext uri="{FF2B5EF4-FFF2-40B4-BE49-F238E27FC236}">
+                <a16:creationId xmlns:a16="http://schemas.microsoft.com/office/drawing/2014/main" id="{6741EA30-4669-4E78-B876-FF6B27D562F9}"/>
+              </a:ext>
+            </a:extLst>
+          </p:cNvPr>
+          <p:cNvPicPr>
+            <a:picLocks noChangeAspect="1"/>
+          </p:cNvPicPr>
+          <p:nvPr/>
+        </p:nvPicPr>
+        <p:blipFill>
+          <a:blip r:embed="rId2">
+            <a:extLst>
+              <a:ext uri="{28A0092B-C50C-407E-A947-70E740481C1C}">
+                <a14:useLocalDpi xmlns:a14="http://schemas.microsoft.com/office/drawing/2010/main" val="0"/>
+              </a:ext>
+            </a:extLst>
+          </a:blip>
+          <a:stretch>
+            <a:fillRect/>
+          </a:stretch>
+        </p:blipFill>
+        <p:spPr>
+          <a:xfrm rot="16200000">
+            <a:off x="5992437" y="713859"/>
+            <a:ext cx="4953442" cy="6604589"/>
+          </a:xfrm>
+          <a:prstGeom prst="rect">
+            <a:avLst/>
+          </a:prstGeom>
+        </p:spPr>
+      </p:pic>
+      <p:sp>
+        <p:nvSpPr>
+          <p:cNvPr id="16" name="Content Placeholder 2">
+            <a:extLst>
+              <a:ext uri="{FF2B5EF4-FFF2-40B4-BE49-F238E27FC236}">
+                <a16:creationId xmlns:a16="http://schemas.microsoft.com/office/drawing/2014/main" id="{4499B414-B6C2-49A5-8CD6-C7F3AD3D7780}"/>
+              </a:ext>
+            </a:extLst>
+          </p:cNvPr>
+          <p:cNvSpPr>
+            <a:spLocks noGrp="1"/>
+          </p:cNvSpPr>
+          <p:nvPr>
+            <p:ph idx="1"/>
+          </p:nvPr>
+        </p:nvSpPr>
+        <p:spPr>
+          <a:xfrm>
+            <a:off x="838200" y="1825625"/>
+            <a:ext cx="4104190" cy="4351338"/>
+          </a:xfrm>
+        </p:spPr>
+        <p:txBody>
+          <a:bodyPr/>
+          <a:lstStyle/>
+          <a:p>
+            <a:pPr marL="0" indent="0">
+              <a:buNone/>
+            </a:pPr>
+            <a:r>
+              <a:rPr lang="en-US" b="1" dirty="0"/>
+              <a:t>Calculate % of pixels that meet threshold to be considered pink:</a:t>
+            </a:r>
+          </a:p>
+          <a:p>
+            <a:r>
+              <a:rPr lang="en-US" dirty="0"/>
+              <a:t>Standardize area considered</a:t>
+            </a:r>
+          </a:p>
+          <a:p>
+            <a:r>
+              <a:rPr lang="en-US" dirty="0"/>
+              <a:t>Count pixels in area that meet threshold</a:t>
+            </a:r>
+          </a:p>
+          <a:p>
+            <a:pPr marL="0" indent="0">
+              <a:buNone/>
+            </a:pPr>
+            <a:endParaRPr lang="en-US" dirty="0"/>
+          </a:p>
+          <a:p>
+            <a:endParaRPr lang="en-US" dirty="0"/>
+          </a:p>
+        </p:txBody>
+      </p:sp>
+    </p:spTree>
+    <p:extLst>
+      <p:ext uri="{BB962C8B-B14F-4D97-AF65-F5344CB8AC3E}">
+        <p14:creationId xmlns:p14="http://schemas.microsoft.com/office/powerpoint/2010/main" val="126001077"/>
+      </p:ext>
+    </p:extLst>
+  </p:cSld>
+  <p:clrMapOvr>
+    <a:masterClrMapping/>
+  </p:clrMapOvr>
+</p:sld>
+</file>
+
+<file path=ppt/slides/slide6.xml><?xml version="1.0" encoding="utf-8"?>
+<p:sld xmlns:a="http://schemas.openxmlformats.org/drawingml/2006/main" xmlns:r="http://schemas.openxmlformats.org/officeDocument/2006/relationships" xmlns:p="http://schemas.openxmlformats.org/presentationml/2006/main">
+  <p:cSld>
+    <p:spTree>
+      <p:nvGrpSpPr>
+        <p:cNvPr id="1" name=""/>
+        <p:cNvGrpSpPr/>
+        <p:nvPr/>
+      </p:nvGrpSpPr>
+      <p:grpSpPr>
+        <a:xfrm>
+          <a:off x="0" y="0"/>
+          <a:ext cx="0" cy="0"/>
+          <a:chOff x="0" y="0"/>
+          <a:chExt cx="0" cy="0"/>
+        </a:xfrm>
+      </p:grpSpPr>
+      <p:sp>
+        <p:nvSpPr>
+          <p:cNvPr id="2" name="Title 1">
+            <a:extLst>
+              <a:ext uri="{FF2B5EF4-FFF2-40B4-BE49-F238E27FC236}">
+                <a16:creationId xmlns:a16="http://schemas.microsoft.com/office/drawing/2014/main" id="{59013583-506F-4E28-AA8F-D394ACA42332}"/>
+              </a:ext>
+            </a:extLst>
+          </p:cNvPr>
+          <p:cNvSpPr>
+            <a:spLocks noGrp="1"/>
+          </p:cNvSpPr>
+          <p:nvPr>
+            <p:ph type="title"/>
+          </p:nvPr>
+        </p:nvSpPr>
+        <p:spPr/>
+        <p:txBody>
+          <a:bodyPr/>
+          <a:lstStyle/>
+          <a:p>
+            <a:r>
+              <a:rPr lang="en-US" dirty="0">
+                <a:solidFill>
+                  <a:schemeClr val="accent1">
+                    <a:lumMod val="50000"/>
+                  </a:schemeClr>
+                </a:solidFill>
+              </a:rPr>
+              <a:t>Image processing in GIMP</a:t>
+            </a:r>
+          </a:p>
+        </p:txBody>
+      </p:sp>
+      <p:pic>
+        <p:nvPicPr>
+          <p:cNvPr id="6" name="Picture 5" descr="A close up of a logo&#10;&#10;Description automatically generated">
+            <a:extLst>
+              <a:ext uri="{FF2B5EF4-FFF2-40B4-BE49-F238E27FC236}">
+                <a16:creationId xmlns:a16="http://schemas.microsoft.com/office/drawing/2014/main" id="{0B95AB9B-8A33-4242-B15B-C47F23AB3164}"/>
+              </a:ext>
+            </a:extLst>
+          </p:cNvPr>
+          <p:cNvPicPr>
+            <a:picLocks noChangeAspect="1"/>
+          </p:cNvPicPr>
+          <p:nvPr/>
+        </p:nvPicPr>
+        <p:blipFill rotWithShape="1">
+          <a:blip r:embed="rId2">
+            <a:extLst>
+              <a:ext uri="{28A0092B-C50C-407E-A947-70E740481C1C}">
+                <a14:useLocalDpi xmlns:a14="http://schemas.microsoft.com/office/drawing/2010/main" val="0"/>
+              </a:ext>
+            </a:extLst>
+          </a:blip>
+          <a:srcRect l="8594" r="3672"/>
+          <a:stretch/>
+        </p:blipFill>
+        <p:spPr>
+          <a:xfrm>
+            <a:off x="6280243" y="1924620"/>
+            <a:ext cx="5289630" cy="3797494"/>
+          </a:xfrm>
+          <a:prstGeom prst="rect">
+            <a:avLst/>
+          </a:prstGeom>
+        </p:spPr>
+      </p:pic>
+      <p:pic>
+        <p:nvPicPr>
+          <p:cNvPr id="9" name="Picture 8" descr="A picture containing food&#10;&#10;Description automatically generated">
+            <a:extLst>
+              <a:ext uri="{FF2B5EF4-FFF2-40B4-BE49-F238E27FC236}">
+                <a16:creationId xmlns:a16="http://schemas.microsoft.com/office/drawing/2014/main" id="{6B45A6D2-C26F-4385-800C-8B0423B37873}"/>
+              </a:ext>
+            </a:extLst>
+          </p:cNvPr>
+          <p:cNvPicPr>
+            <a:picLocks noChangeAspect="1"/>
+          </p:cNvPicPr>
+          <p:nvPr/>
+        </p:nvPicPr>
+        <p:blipFill>
+          <a:blip r:embed="rId3">
+            <a:extLst>
+              <a:ext uri="{28A0092B-C50C-407E-A947-70E740481C1C}">
+                <a14:useLocalDpi xmlns:a14="http://schemas.microsoft.com/office/drawing/2010/main" val="0"/>
+              </a:ext>
+            </a:extLst>
+          </a:blip>
+          <a:stretch>
+            <a:fillRect/>
+          </a:stretch>
+        </p:blipFill>
+        <p:spPr>
+          <a:xfrm rot="16200000">
+            <a:off x="1216943" y="1291704"/>
+            <a:ext cx="3797496" cy="5063328"/>
+          </a:xfrm>
+          <a:prstGeom prst="rect">
+            <a:avLst/>
+          </a:prstGeom>
+        </p:spPr>
+      </p:pic>
+      <p:cxnSp>
+        <p:nvCxnSpPr>
+          <p:cNvPr id="8" name="Straight Arrow Connector 7">
+            <a:extLst>
+              <a:ext uri="{FF2B5EF4-FFF2-40B4-BE49-F238E27FC236}">
+                <a16:creationId xmlns:a16="http://schemas.microsoft.com/office/drawing/2014/main" id="{1BCF6C6D-F964-4CDD-8CEE-1D5B2D2D7607}"/>
+              </a:ext>
+            </a:extLst>
+          </p:cNvPr>
+          <p:cNvCxnSpPr>
+            <a:stCxn id="9" idx="2"/>
+            <a:endCxn id="6" idx="1"/>
+          </p:cNvCxnSpPr>
+          <p:nvPr/>
+        </p:nvCxnSpPr>
+        <p:spPr>
+          <a:xfrm flipV="1">
+            <a:off x="5647355" y="3823367"/>
+            <a:ext cx="632888" cy="1"/>
+          </a:xfrm>
+          <a:prstGeom prst="straightConnector1">
+            <a:avLst/>
+          </a:prstGeom>
+          <a:ln w="38100">
+            <a:tailEnd type="triangle"/>
+          </a:ln>
+        </p:spPr>
+        <p:style>
+          <a:lnRef idx="1">
+            <a:schemeClr val="accent1"/>
+          </a:lnRef>
+          <a:fillRef idx="0">
+            <a:schemeClr val="accent1"/>
+          </a:fillRef>
+          <a:effectRef idx="0">
+            <a:schemeClr val="accent1"/>
+          </a:effectRef>
+          <a:fontRef idx="minor">
+            <a:schemeClr val="tx1"/>
+          </a:fontRef>
+        </p:style>
+      </p:cxnSp>
+    </p:spTree>
+    <p:extLst>
+      <p:ext uri="{BB962C8B-B14F-4D97-AF65-F5344CB8AC3E}">
+        <p14:creationId xmlns:p14="http://schemas.microsoft.com/office/powerpoint/2010/main" val="4153975001"/>
+      </p:ext>
+    </p:extLst>
+  </p:cSld>
+  <p:clrMapOvr>
+    <a:masterClrMapping/>
+  </p:clrMapOvr>
+</p:sld>
+</file>
+
+<file path=ppt/slides/slide7.xml><?xml version="1.0" encoding="utf-8"?>
+<p:sld xmlns:a="http://schemas.openxmlformats.org/drawingml/2006/main" xmlns:r="http://schemas.openxmlformats.org/officeDocument/2006/relationships" xmlns:p="http://schemas.openxmlformats.org/presentationml/2006/main">
+  <p:cSld>
+    <p:spTree>
+      <p:nvGrpSpPr>
+        <p:cNvPr id="1" name=""/>
+        <p:cNvGrpSpPr/>
+        <p:nvPr/>
+      </p:nvGrpSpPr>
+      <p:grpSpPr>
+        <a:xfrm>
+          <a:off x="0" y="0"/>
+          <a:ext cx="0" cy="0"/>
+          <a:chOff x="0" y="0"/>
+          <a:chExt cx="0" cy="0"/>
+        </a:xfrm>
+      </p:grpSpPr>
+      <p:sp>
+        <p:nvSpPr>
+          <p:cNvPr id="2" name="Title 1">
+            <a:extLst>
+              <a:ext uri="{FF2B5EF4-FFF2-40B4-BE49-F238E27FC236}">
+                <a16:creationId xmlns:a16="http://schemas.microsoft.com/office/drawing/2014/main" id="{59013583-506F-4E28-AA8F-D394ACA42332}"/>
+              </a:ext>
+            </a:extLst>
+          </p:cNvPr>
+          <p:cNvSpPr>
+            <a:spLocks noGrp="1"/>
+          </p:cNvSpPr>
+          <p:nvPr>
+            <p:ph type="title"/>
+          </p:nvPr>
+        </p:nvSpPr>
+        <p:spPr/>
+        <p:txBody>
+          <a:bodyPr/>
+          <a:lstStyle/>
+          <a:p>
+            <a:r>
+              <a:rPr lang="en-US" dirty="0">
+                <a:solidFill>
+                  <a:schemeClr val="accent1">
+                    <a:lumMod val="50000"/>
+                  </a:schemeClr>
+                </a:solidFill>
+              </a:rPr>
+              <a:t>Image processing in GIMP</a:t>
+            </a:r>
+          </a:p>
+        </p:txBody>
+      </p:sp>
+      <p:pic>
+        <p:nvPicPr>
+          <p:cNvPr id="4" name="Picture 3" descr="A picture containing bag&#10;&#10;Description automatically generated">
+            <a:extLst>
+              <a:ext uri="{FF2B5EF4-FFF2-40B4-BE49-F238E27FC236}">
+                <a16:creationId xmlns:a16="http://schemas.microsoft.com/office/drawing/2014/main" id="{92F3073B-86CD-4AE2-816C-EAB50A261220}"/>
+              </a:ext>
+            </a:extLst>
+          </p:cNvPr>
+          <p:cNvPicPr>
+            <a:picLocks noChangeAspect="1"/>
+          </p:cNvPicPr>
+          <p:nvPr/>
+        </p:nvPicPr>
+        <p:blipFill>
+          <a:blip r:embed="rId2">
+            <a:extLst>
+              <a:ext uri="{28A0092B-C50C-407E-A947-70E740481C1C}">
+                <a14:useLocalDpi xmlns:a14="http://schemas.microsoft.com/office/drawing/2010/main" val="0"/>
+              </a:ext>
+            </a:extLst>
+          </a:blip>
+          <a:stretch>
+            <a:fillRect/>
+          </a:stretch>
+        </p:blipFill>
+        <p:spPr>
+          <a:xfrm>
+            <a:off x="215302" y="1965085"/>
+            <a:ext cx="5613998" cy="3530840"/>
+          </a:xfrm>
+          <a:prstGeom prst="rect">
+            <a:avLst/>
+          </a:prstGeom>
+        </p:spPr>
+      </p:pic>
+      <p:pic>
+        <p:nvPicPr>
+          <p:cNvPr id="7" name="Picture 6" descr="A picture containing computer&#10;&#10;Description automatically generated">
+            <a:extLst>
+              <a:ext uri="{FF2B5EF4-FFF2-40B4-BE49-F238E27FC236}">
+                <a16:creationId xmlns:a16="http://schemas.microsoft.com/office/drawing/2014/main" id="{D392863D-1577-4C97-A7B6-DE00A3290440}"/>
+              </a:ext>
+            </a:extLst>
+          </p:cNvPr>
+          <p:cNvPicPr>
+            <a:picLocks noChangeAspect="1"/>
+          </p:cNvPicPr>
+          <p:nvPr/>
+        </p:nvPicPr>
+        <p:blipFill>
+          <a:blip r:embed="rId3">
+            <a:extLst>
+              <a:ext uri="{28A0092B-C50C-407E-A947-70E740481C1C}">
+                <a14:useLocalDpi xmlns:a14="http://schemas.microsoft.com/office/drawing/2010/main" val="0"/>
+              </a:ext>
+            </a:extLst>
+          </a:blip>
+          <a:stretch>
+            <a:fillRect/>
+          </a:stretch>
+        </p:blipFill>
+        <p:spPr>
+          <a:xfrm>
+            <a:off x="6362700" y="1965085"/>
+            <a:ext cx="5613998" cy="3534600"/>
+          </a:xfrm>
+          <a:prstGeom prst="rect">
+            <a:avLst/>
+          </a:prstGeom>
+        </p:spPr>
+      </p:pic>
+      <p:cxnSp>
+        <p:nvCxnSpPr>
+          <p:cNvPr id="10" name="Straight Arrow Connector 9">
+            <a:extLst>
+              <a:ext uri="{FF2B5EF4-FFF2-40B4-BE49-F238E27FC236}">
+                <a16:creationId xmlns:a16="http://schemas.microsoft.com/office/drawing/2014/main" id="{07BDCCF7-656E-4718-BAA7-980C78490498}"/>
+              </a:ext>
+            </a:extLst>
+          </p:cNvPr>
+          <p:cNvCxnSpPr>
+            <a:cxnSpLocks/>
+            <a:stCxn id="4" idx="3"/>
+            <a:endCxn id="7" idx="1"/>
+          </p:cNvCxnSpPr>
+          <p:nvPr/>
+        </p:nvCxnSpPr>
+        <p:spPr>
+          <a:xfrm>
+            <a:off x="5829300" y="3730505"/>
+            <a:ext cx="533400" cy="1880"/>
+          </a:xfrm>
+          <a:prstGeom prst="straightConnector1">
+            <a:avLst/>
+          </a:prstGeom>
+          <a:ln w="38100">
+            <a:tailEnd type="triangle"/>
+          </a:ln>
+        </p:spPr>
+        <p:style>
+          <a:lnRef idx="1">
+            <a:schemeClr val="accent1"/>
+          </a:lnRef>
+          <a:fillRef idx="0">
+            <a:schemeClr val="accent1"/>
+          </a:fillRef>
+          <a:effectRef idx="0">
+            <a:schemeClr val="accent1"/>
+          </a:effectRef>
+          <a:fontRef idx="minor">
+            <a:schemeClr val="tx1"/>
+          </a:fontRef>
+        </p:style>
+      </p:cxnSp>
+    </p:spTree>
+    <p:extLst>
+      <p:ext uri="{BB962C8B-B14F-4D97-AF65-F5344CB8AC3E}">
+        <p14:creationId xmlns:p14="http://schemas.microsoft.com/office/powerpoint/2010/main" val="2304264243"/>
+      </p:ext>
+    </p:extLst>
+  </p:cSld>
+  <p:clrMapOvr>
+    <a:masterClrMapping/>
+  </p:clrMapOvr>
+</p:sld>
+</file>
+
+<file path=ppt/slides/slide8.xml><?xml version="1.0" encoding="utf-8"?>
+<p:sld xmlns:a="http://schemas.openxmlformats.org/drawingml/2006/main" xmlns:r="http://schemas.openxmlformats.org/officeDocument/2006/relationships" xmlns:p="http://schemas.openxmlformats.org/presentationml/2006/main">
+  <p:cSld>
+    <p:spTree>
+      <p:nvGrpSpPr>
+        <p:cNvPr id="1" name=""/>
+        <p:cNvGrpSpPr/>
+        <p:nvPr/>
+      </p:nvGrpSpPr>
+      <p:grpSpPr>
+        <a:xfrm>
+          <a:off x="0" y="0"/>
+          <a:ext cx="0" cy="0"/>
+          <a:chOff x="0" y="0"/>
+          <a:chExt cx="0" cy="0"/>
+        </a:xfrm>
+      </p:grpSpPr>
+      <p:sp>
+        <p:nvSpPr>
+          <p:cNvPr id="2" name="Title 1">
+            <a:extLst>
+              <a:ext uri="{FF2B5EF4-FFF2-40B4-BE49-F238E27FC236}">
+                <a16:creationId xmlns:a16="http://schemas.microsoft.com/office/drawing/2014/main" id="{59013583-506F-4E28-AA8F-D394ACA42332}"/>
+              </a:ext>
+            </a:extLst>
+          </p:cNvPr>
+          <p:cNvSpPr>
+            <a:spLocks noGrp="1"/>
+          </p:cNvSpPr>
+          <p:nvPr>
+            <p:ph type="title"/>
+          </p:nvPr>
+        </p:nvSpPr>
+        <p:spPr/>
+        <p:txBody>
+          <a:bodyPr/>
+          <a:lstStyle/>
+          <a:p>
+            <a:r>
+              <a:rPr lang="en-US" dirty="0">
+                <a:solidFill>
+                  <a:schemeClr val="accent1">
+                    <a:lumMod val="50000"/>
+                  </a:schemeClr>
+                </a:solidFill>
+              </a:rPr>
+              <a:t>Image processing in GIMP</a:t>
+            </a:r>
+          </a:p>
+        </p:txBody>
+      </p:sp>
+      <p:cxnSp>
+        <p:nvCxnSpPr>
+          <p:cNvPr id="10" name="Straight Arrow Connector 9">
+            <a:extLst>
+              <a:ext uri="{FF2B5EF4-FFF2-40B4-BE49-F238E27FC236}">
+                <a16:creationId xmlns:a16="http://schemas.microsoft.com/office/drawing/2014/main" id="{07BDCCF7-656E-4718-BAA7-980C78490498}"/>
+              </a:ext>
+            </a:extLst>
+          </p:cNvPr>
+          <p:cNvCxnSpPr>
+            <a:cxnSpLocks/>
+            <a:stCxn id="5" idx="3"/>
+            <a:endCxn id="8" idx="1"/>
+          </p:cNvCxnSpPr>
+          <p:nvPr/>
+        </p:nvCxnSpPr>
+        <p:spPr>
+          <a:xfrm>
+            <a:off x="5819774" y="3716445"/>
+            <a:ext cx="533401" cy="0"/>
+          </a:xfrm>
+          <a:prstGeom prst="straightConnector1">
+            <a:avLst/>
+          </a:prstGeom>
+          <a:ln w="38100">
+            <a:tailEnd type="triangle"/>
+          </a:ln>
+        </p:spPr>
+        <p:style>
+          <a:lnRef idx="1">
+            <a:schemeClr val="accent1"/>
+          </a:lnRef>
+          <a:fillRef idx="0">
+            <a:schemeClr val="accent1"/>
+          </a:fillRef>
+          <a:effectRef idx="0">
+            <a:schemeClr val="accent1"/>
+          </a:effectRef>
+          <a:fontRef idx="minor">
+            <a:schemeClr val="tx1"/>
+          </a:fontRef>
+        </p:style>
+      </p:cxnSp>
+      <p:pic>
+        <p:nvPicPr>
+          <p:cNvPr id="5" name="Picture 4" descr="A picture containing speaker, clock&#10;&#10;Description automatically generated">
+            <a:extLst>
+              <a:ext uri="{FF2B5EF4-FFF2-40B4-BE49-F238E27FC236}">
+                <a16:creationId xmlns:a16="http://schemas.microsoft.com/office/drawing/2014/main" id="{39473884-3367-4A85-B920-3CF14251E03F}"/>
+              </a:ext>
+            </a:extLst>
+          </p:cNvPr>
+          <p:cNvPicPr>
+            <a:picLocks noChangeAspect="1"/>
+          </p:cNvPicPr>
+          <p:nvPr/>
+        </p:nvPicPr>
+        <p:blipFill>
+          <a:blip r:embed="rId2">
+            <a:extLst>
+              <a:ext uri="{28A0092B-C50C-407E-A947-70E740481C1C}">
+                <a14:useLocalDpi xmlns:a14="http://schemas.microsoft.com/office/drawing/2010/main" val="0"/>
+              </a:ext>
+            </a:extLst>
+          </a:blip>
+          <a:stretch>
+            <a:fillRect/>
+          </a:stretch>
+        </p:blipFill>
+        <p:spPr>
+          <a:xfrm>
+            <a:off x="331957" y="1988594"/>
+            <a:ext cx="5487817" cy="3455702"/>
+          </a:xfrm>
+          <a:prstGeom prst="rect">
+            <a:avLst/>
+          </a:prstGeom>
+        </p:spPr>
+      </p:pic>
+      <p:pic>
+        <p:nvPicPr>
+          <p:cNvPr id="8" name="Picture 7" descr="A close up of a sign&#10;&#10;Description automatically generated">
+            <a:extLst>
+              <a:ext uri="{FF2B5EF4-FFF2-40B4-BE49-F238E27FC236}">
+                <a16:creationId xmlns:a16="http://schemas.microsoft.com/office/drawing/2014/main" id="{9AF73CF1-D443-4F09-B5D5-28BFF7D5C7C2}"/>
+              </a:ext>
+            </a:extLst>
+          </p:cNvPr>
+          <p:cNvPicPr>
+            <a:picLocks noChangeAspect="1"/>
+          </p:cNvPicPr>
+          <p:nvPr/>
+        </p:nvPicPr>
+        <p:blipFill>
+          <a:blip r:embed="rId3">
+            <a:extLst>
+              <a:ext uri="{28A0092B-C50C-407E-A947-70E740481C1C}">
+                <a14:useLocalDpi xmlns:a14="http://schemas.microsoft.com/office/drawing/2010/main" val="0"/>
+              </a:ext>
+            </a:extLst>
+          </a:blip>
+          <a:stretch>
+            <a:fillRect/>
+          </a:stretch>
+        </p:blipFill>
+        <p:spPr>
+          <a:xfrm>
+            <a:off x="6353175" y="1988594"/>
+            <a:ext cx="5501890" cy="3455702"/>
+          </a:xfrm>
+          <a:prstGeom prst="rect">
+            <a:avLst/>
+          </a:prstGeom>
+        </p:spPr>
+      </p:pic>
+    </p:spTree>
+    <p:extLst>
+      <p:ext uri="{BB962C8B-B14F-4D97-AF65-F5344CB8AC3E}">
+        <p14:creationId xmlns:p14="http://schemas.microsoft.com/office/powerpoint/2010/main" val="2657145289"/>
+      </p:ext>
+    </p:extLst>
+  </p:cSld>
+  <p:clrMapOvr>
+    <a:masterClrMapping/>
+  </p:clrMapOvr>
+</p:sld>
+</file>
+
+<file path=ppt/slides/slide9.xml><?xml version="1.0" encoding="utf-8"?>
+<p:sld xmlns:a="http://schemas.openxmlformats.org/drawingml/2006/main" xmlns:r="http://schemas.openxmlformats.org/officeDocument/2006/relationships" xmlns:p="http://schemas.openxmlformats.org/presentationml/2006/main">
+  <p:cSld>
+    <p:spTree>
+      <p:nvGrpSpPr>
+        <p:cNvPr id="1" name=""/>
+        <p:cNvGrpSpPr/>
+        <p:nvPr/>
+      </p:nvGrpSpPr>
+      <p:grpSpPr>
+        <a:xfrm>
+          <a:off x="0" y="0"/>
+          <a:ext cx="0" cy="0"/>
+          <a:chOff x="0" y="0"/>
+          <a:chExt cx="0" cy="0"/>
+        </a:xfrm>
+      </p:grpSpPr>
+      <p:sp>
+        <p:nvSpPr>
+          <p:cNvPr id="2" name="Title 1">
+            <a:extLst>
+              <a:ext uri="{FF2B5EF4-FFF2-40B4-BE49-F238E27FC236}">
+                <a16:creationId xmlns:a16="http://schemas.microsoft.com/office/drawing/2014/main" id="{DA96016F-AED4-4B39-9EE0-2944C84A5329}"/>
+              </a:ext>
+            </a:extLst>
+          </p:cNvPr>
+          <p:cNvSpPr>
+            <a:spLocks noGrp="1"/>
+          </p:cNvSpPr>
+          <p:nvPr>
+            <p:ph type="title"/>
+          </p:nvPr>
+        </p:nvSpPr>
+        <p:spPr/>
+        <p:txBody>
+          <a:bodyPr/>
+          <a:lstStyle/>
+          <a:p>
+            <a:r>
+              <a:rPr lang="en-US" dirty="0">
+                <a:solidFill>
+                  <a:schemeClr val="accent1">
+                    <a:lumMod val="50000"/>
+                  </a:schemeClr>
+                </a:solidFill>
+              </a:rPr>
+              <a:t>Output</a:t>
+            </a:r>
+          </a:p>
+        </p:txBody>
+      </p:sp>
+      <p:pic>
+        <p:nvPicPr>
+          <p:cNvPr id="5" name="Content Placeholder 4" descr="A close up of a map&#10;&#10;Description automatically generated">
+            <a:extLst>
+              <a:ext uri="{FF2B5EF4-FFF2-40B4-BE49-F238E27FC236}">
+                <a16:creationId xmlns:a16="http://schemas.microsoft.com/office/drawing/2014/main" id="{7A35EA77-6CD5-4A33-9E47-6E37480F3DCB}"/>
+              </a:ext>
+            </a:extLst>
+          </p:cNvPr>
+          <p:cNvPicPr>
+            <a:picLocks noGrp="1" noChangeAspect="1"/>
+          </p:cNvPicPr>
+          <p:nvPr>
+            <p:ph idx="1"/>
+          </p:nvPr>
+        </p:nvPicPr>
+        <p:blipFill>
+          <a:blip r:embed="rId2">
+            <a:extLst>
+              <a:ext uri="{28A0092B-C50C-407E-A947-70E740481C1C}">
+                <a14:useLocalDpi xmlns:a14="http://schemas.microsoft.com/office/drawing/2010/main" val="0"/>
+              </a:ext>
+            </a:extLst>
+          </a:blip>
+          <a:stretch>
+            <a:fillRect/>
+          </a:stretch>
+        </p:blipFill>
+        <p:spPr>
+          <a:xfrm>
+            <a:off x="5868693" y="1449774"/>
+            <a:ext cx="5989932" cy="4727189"/>
+          </a:xfrm>
+        </p:spPr>
+      </p:pic>
+      <p:sp>
+        <p:nvSpPr>
+          <p:cNvPr id="6" name="Content Placeholder 2">
+            <a:extLst>
+              <a:ext uri="{FF2B5EF4-FFF2-40B4-BE49-F238E27FC236}">
+                <a16:creationId xmlns:a16="http://schemas.microsoft.com/office/drawing/2014/main" id="{C97AED02-30F2-4000-A9B1-399FFC787A03}"/>
+              </a:ext>
+            </a:extLst>
+          </p:cNvPr>
+          <p:cNvSpPr txBox="1">
+            <a:spLocks/>
+          </p:cNvSpPr>
+          <p:nvPr/>
+        </p:nvSpPr>
+        <p:spPr>
+          <a:xfrm>
+            <a:off x="838199" y="1825625"/>
+            <a:ext cx="4238625" cy="4351338"/>
+          </a:xfrm>
+          <a:prstGeom prst="rect">
+            <a:avLst/>
+          </a:prstGeom>
+        </p:spPr>
+        <p:txBody>
+          <a:bodyPr vert="horz" lIns="91440" tIns="45720" rIns="91440" bIns="45720" rtlCol="0">
+            <a:normAutofit/>
+          </a:bodyPr>
+          <a:lstStyle>
+            <a:lvl1pPr marL="228600" indent="-228600" algn="l" defTabSz="914400" rtl="0" eaLnBrk="1" latinLnBrk="0" hangingPunct="1">
+              <a:lnSpc>
+                <a:spcPct val="90000"/>
+              </a:lnSpc>
+              <a:spcBef>
+                <a:spcPts val="1000"/>
+              </a:spcBef>
+              <a:buFont typeface="Arial" panose="020B0604020202020204" pitchFamily="34" charset="0"/>
+              <a:buChar char="•"/>
+              <a:defRPr sz="2800" kern="1200">
+                <a:solidFill>
+                  <a:schemeClr val="tx1"/>
+                </a:solidFill>
+                <a:latin typeface="+mn-lt"/>
+                <a:ea typeface="+mn-ea"/>
+                <a:cs typeface="+mn-cs"/>
+              </a:defRPr>
+            </a:lvl1pPr>
+            <a:lvl2pPr marL="685800" indent="-228600" algn="l" defTabSz="914400" rtl="0" eaLnBrk="1" latinLnBrk="0" hangingPunct="1">
+              <a:lnSpc>
+                <a:spcPct val="90000"/>
+              </a:lnSpc>
+              <a:spcBef>
+                <a:spcPts val="500"/>
+              </a:spcBef>
+              <a:buFont typeface="Arial" panose="020B0604020202020204" pitchFamily="34" charset="0"/>
+              <a:buChar char="•"/>
+              <a:defRPr sz="2400" kern="1200">
+                <a:solidFill>
+                  <a:schemeClr val="tx1"/>
+                </a:solidFill>
+                <a:latin typeface="+mn-lt"/>
+                <a:ea typeface="+mn-ea"/>
+                <a:cs typeface="+mn-cs"/>
+              </a:defRPr>
+            </a:lvl2pPr>
+            <a:lvl3pPr marL="1143000" indent="-228600" algn="l" defTabSz="914400" rtl="0" eaLnBrk="1" latinLnBrk="0" hangingPunct="1">
+              <a:lnSpc>
+                <a:spcPct val="90000"/>
+              </a:lnSpc>
+              <a:spcBef>
+                <a:spcPts val="500"/>
+              </a:spcBef>
+              <a:buFont typeface="Arial" panose="020B0604020202020204" pitchFamily="34" charset="0"/>
+              <a:buChar char="•"/>
+              <a:defRPr sz="2000" kern="1200">
+                <a:solidFill>
+                  <a:schemeClr val="tx1"/>
+                </a:solidFill>
+                <a:latin typeface="+mn-lt"/>
+                <a:ea typeface="+mn-ea"/>
+                <a:cs typeface="+mn-cs"/>
+              </a:defRPr>
+            </a:lvl3pPr>
+            <a:lvl4pPr marL="1600200" indent="-228600" algn="l" defTabSz="914400" rtl="0" eaLnBrk="1" latinLnBrk="0" hangingPunct="1">
+              <a:lnSpc>
+                <a:spcPct val="90000"/>
+              </a:lnSpc>
+              <a:spcBef>
+                <a:spcPts val="500"/>
+              </a:spcBef>
+              <a:buFont typeface="Arial" panose="020B0604020202020204" pitchFamily="34" charset="0"/>
+              <a:buChar char="•"/>
+              <a:defRPr sz="1800" kern="1200">
+                <a:solidFill>
+                  <a:schemeClr val="tx1"/>
+                </a:solidFill>
+                <a:latin typeface="+mn-lt"/>
+                <a:ea typeface="+mn-ea"/>
+                <a:cs typeface="+mn-cs"/>
+              </a:defRPr>
+            </a:lvl4pPr>
+            <a:lvl5pPr marL="2057400" indent="-228600" algn="l" defTabSz="914400" rtl="0" eaLnBrk="1" latinLnBrk="0" hangingPunct="1">
+              <a:lnSpc>
+                <a:spcPct val="90000"/>
+              </a:lnSpc>
+              <a:spcBef>
+                <a:spcPts val="500"/>
+              </a:spcBef>
+              <a:buFont typeface="Arial" panose="020B0604020202020204" pitchFamily="34" charset="0"/>
+              <a:buChar char="•"/>
+              <a:defRPr sz="1800" kern="1200">
+                <a:solidFill>
+                  <a:schemeClr val="tx1"/>
+                </a:solidFill>
+                <a:latin typeface="+mn-lt"/>
+                <a:ea typeface="+mn-ea"/>
+                <a:cs typeface="+mn-cs"/>
+              </a:defRPr>
+            </a:lvl5pPr>
+            <a:lvl6pPr marL="2514600" indent="-228600" algn="l" defTabSz="914400" rtl="0" eaLnBrk="1" latinLnBrk="0" hangingPunct="1">
+              <a:lnSpc>
+                <a:spcPct val="90000"/>
+              </a:lnSpc>
+              <a:spcBef>
+                <a:spcPts val="500"/>
+              </a:spcBef>
+              <a:buFont typeface="Arial" panose="020B0604020202020204" pitchFamily="34" charset="0"/>
+              <a:buChar char="•"/>
+              <a:defRPr sz="1800" kern="1200">
+                <a:solidFill>
+                  <a:schemeClr val="tx1"/>
+                </a:solidFill>
+                <a:latin typeface="+mn-lt"/>
+                <a:ea typeface="+mn-ea"/>
+                <a:cs typeface="+mn-cs"/>
+              </a:defRPr>
+            </a:lvl6pPr>
+            <a:lvl7pPr marL="2971800" indent="-228600" algn="l" defTabSz="914400" rtl="0" eaLnBrk="1" latinLnBrk="0" hangingPunct="1">
+              <a:lnSpc>
+                <a:spcPct val="90000"/>
+              </a:lnSpc>
+              <a:spcBef>
+                <a:spcPts val="500"/>
+              </a:spcBef>
+              <a:buFont typeface="Arial" panose="020B0604020202020204" pitchFamily="34" charset="0"/>
+              <a:buChar char="•"/>
+              <a:defRPr sz="1800" kern="1200">
+                <a:solidFill>
+                  <a:schemeClr val="tx1"/>
+                </a:solidFill>
+                <a:latin typeface="+mn-lt"/>
+                <a:ea typeface="+mn-ea"/>
+                <a:cs typeface="+mn-cs"/>
+              </a:defRPr>
+            </a:lvl7pPr>
+            <a:lvl8pPr marL="3429000" indent="-228600" algn="l" defTabSz="914400" rtl="0" eaLnBrk="1" latinLnBrk="0" hangingPunct="1">
+              <a:lnSpc>
+                <a:spcPct val="90000"/>
+              </a:lnSpc>
+              <a:spcBef>
+                <a:spcPts val="500"/>
+              </a:spcBef>
+              <a:buFont typeface="Arial" panose="020B0604020202020204" pitchFamily="34" charset="0"/>
+              <a:buChar char="•"/>
+              <a:defRPr sz="1800" kern="1200">
+                <a:solidFill>
+                  <a:schemeClr val="tx1"/>
+                </a:solidFill>
+                <a:latin typeface="+mn-lt"/>
+                <a:ea typeface="+mn-ea"/>
+                <a:cs typeface="+mn-cs"/>
+              </a:defRPr>
+            </a:lvl8pPr>
+            <a:lvl9pPr marL="3886200" indent="-228600" algn="l" defTabSz="914400" rtl="0" eaLnBrk="1" latinLnBrk="0" hangingPunct="1">
+              <a:lnSpc>
+                <a:spcPct val="90000"/>
+              </a:lnSpc>
+              <a:spcBef>
+                <a:spcPts val="500"/>
+              </a:spcBef>
+              <a:buFont typeface="Arial" panose="020B0604020202020204" pitchFamily="34" charset="0"/>
+              <a:buChar char="•"/>
+              <a:defRPr sz="1800" kern="1200">
+                <a:solidFill>
+                  <a:schemeClr val="tx1"/>
+                </a:solidFill>
+                <a:latin typeface="+mn-lt"/>
+                <a:ea typeface="+mn-ea"/>
+                <a:cs typeface="+mn-cs"/>
+              </a:defRPr>
+            </a:lvl9pPr>
+          </a:lstStyle>
+          <a:p>
+            <a:r>
+              <a:rPr lang="en-US" dirty="0"/>
+              <a:t>Calculate % pink pixels for each wounding site</a:t>
+            </a:r>
+          </a:p>
+          <a:p>
+            <a:r>
+              <a:rPr lang="en-US" dirty="0"/>
+              <a:t>Standard deviation and significance of treatments</a:t>
+            </a:r>
+          </a:p>
+          <a:p>
+            <a:endParaRPr lang="en-US" dirty="0"/>
+          </a:p>
+        </p:txBody>
+      </p:sp>
+    </p:spTree>
+    <p:extLst>
+      <p:ext uri="{BB962C8B-B14F-4D97-AF65-F5344CB8AC3E}">
+        <p14:creationId xmlns:p14="http://schemas.microsoft.com/office/powerpoint/2010/main" val="1591381784"/>
       </p:ext>
     </p:extLst>
   </p:cSld>

</xml_diff>